<commit_message>
Filled out NG section of powerpoint
</commit_message>
<xml_diff>
--- a/final/presentation.pptx
+++ b/final/presentation.pptx
@@ -3,11 +3,23 @@
 <p:presentation xmlns:a="http://schemas.openxmlformats.org/drawingml/2006/main" xmlns:p="http://schemas.openxmlformats.org/presentationml/2006/main" xmlns:r="http://schemas.openxmlformats.org/officeDocument/2006/relationships" xmlns:p14="http://schemas.microsoft.com/office/powerpoint/2010/main" xmlns:p15="http://schemas.microsoft.com/office/powerpoint/2012/main" xmlns:mc="http://schemas.openxmlformats.org/markup-compatibility/2006">
   <p:sldMasterIdLst>
     <p:sldMasterId id="2147483648" r:id="rId2"/>
+    <p:sldMasterId id="2147483661" r:id="rId3"/>
   </p:sldMasterIdLst>
   <p:sldIdLst>
-    <p:sldId id="256" r:id="rId3"/>
-    <p:sldId id="257" r:id="rId4"/>
-    <p:sldId id="258" r:id="rId5"/>
+    <p:sldId id="256" r:id="rId4"/>
+    <p:sldId id="257" r:id="rId5"/>
+    <p:sldId id="258" r:id="rId6"/>
+    <p:sldId id="259" r:id="rId7"/>
+    <p:sldId id="260" r:id="rId8"/>
+    <p:sldId id="261" r:id="rId9"/>
+    <p:sldId id="262" r:id="rId10"/>
+    <p:sldId id="263" r:id="rId11"/>
+    <p:sldId id="264" r:id="rId12"/>
+    <p:sldId id="265" r:id="rId13"/>
+    <p:sldId id="266" r:id="rId14"/>
+    <p:sldId id="267" r:id="rId15"/>
+    <p:sldId id="268" r:id="rId16"/>
+    <p:sldId id="269" r:id="rId17"/>
   </p:sldIdLst>
   <p:sldSz cx="10080625" cy="5670550"/>
   <p:notesSz cx="7772400" cy="10058400"/>
@@ -55,7 +67,7 @@
       </p:grpSpPr>
       <p:sp>
         <p:nvSpPr>
-          <p:cNvPr id="26" name="PlaceHolder 1"/>
+          <p:cNvPr id="23" name="PlaceHolder 1"/>
           <p:cNvSpPr>
             <a:spLocks noGrp="1"/>
           </p:cNvSpPr>
@@ -66,7 +78,7 @@
         <p:spPr>
           <a:xfrm>
             <a:off x="504000" y="226080"/>
-            <a:ext cx="9071640" cy="946440"/>
+            <a:ext cx="9071280" cy="946080"/>
           </a:xfrm>
           <a:prstGeom prst="rect">
             <a:avLst/>
@@ -86,7 +98,7 @@
       </p:sp>
       <p:sp>
         <p:nvSpPr>
-          <p:cNvPr id="27" name="PlaceHolder 2"/>
+          <p:cNvPr id="24" name="PlaceHolder 2"/>
           <p:cNvSpPr>
             <a:spLocks noGrp="1"/>
           </p:cNvSpPr>
@@ -97,7 +109,7 @@
         <p:spPr>
           <a:xfrm>
             <a:off x="504000" y="1326600"/>
-            <a:ext cx="9071640" cy="1568160"/>
+            <a:ext cx="9071280" cy="1568160"/>
           </a:xfrm>
           <a:prstGeom prst="rect">
             <a:avLst/>
@@ -116,7 +128,7 @@
       </p:sp>
       <p:sp>
         <p:nvSpPr>
-          <p:cNvPr id="28" name="PlaceHolder 3"/>
+          <p:cNvPr id="25" name="PlaceHolder 3"/>
           <p:cNvSpPr>
             <a:spLocks noGrp="1"/>
           </p:cNvSpPr>
@@ -127,7 +139,7 @@
         <p:spPr>
           <a:xfrm>
             <a:off x="504000" y="3044160"/>
-            <a:ext cx="9071640" cy="1568160"/>
+            <a:ext cx="9071280" cy="1568160"/>
           </a:xfrm>
           <a:prstGeom prst="rect">
             <a:avLst/>
@@ -168,7 +180,7 @@
       </p:grpSpPr>
       <p:sp>
         <p:nvSpPr>
-          <p:cNvPr id="29" name="PlaceHolder 1"/>
+          <p:cNvPr id="26" name="PlaceHolder 1"/>
           <p:cNvSpPr>
             <a:spLocks noGrp="1"/>
           </p:cNvSpPr>
@@ -179,7 +191,7 @@
         <p:spPr>
           <a:xfrm>
             <a:off x="504000" y="226080"/>
-            <a:ext cx="9071640" cy="946440"/>
+            <a:ext cx="9071280" cy="946080"/>
           </a:xfrm>
           <a:prstGeom prst="rect">
             <a:avLst/>
@@ -199,7 +211,7 @@
       </p:sp>
       <p:sp>
         <p:nvSpPr>
-          <p:cNvPr id="30" name="PlaceHolder 2"/>
+          <p:cNvPr id="27" name="PlaceHolder 2"/>
           <p:cNvSpPr>
             <a:spLocks noGrp="1"/>
           </p:cNvSpPr>
@@ -210,7 +222,7 @@
         <p:spPr>
           <a:xfrm>
             <a:off x="504000" y="1326600"/>
-            <a:ext cx="4426920" cy="1568160"/>
+            <a:ext cx="4426560" cy="1568160"/>
           </a:xfrm>
           <a:prstGeom prst="rect">
             <a:avLst/>
@@ -229,7 +241,7 @@
       </p:sp>
       <p:sp>
         <p:nvSpPr>
-          <p:cNvPr id="31" name="PlaceHolder 3"/>
+          <p:cNvPr id="28" name="PlaceHolder 3"/>
           <p:cNvSpPr>
             <a:spLocks noGrp="1"/>
           </p:cNvSpPr>
@@ -239,8 +251,8 @@
         </p:nvSpPr>
         <p:spPr>
           <a:xfrm>
-            <a:off x="5152680" y="1326600"/>
-            <a:ext cx="4426920" cy="1568160"/>
+            <a:off x="5152320" y="1326600"/>
+            <a:ext cx="4426560" cy="1568160"/>
           </a:xfrm>
           <a:prstGeom prst="rect">
             <a:avLst/>
@@ -259,7 +271,7 @@
       </p:sp>
       <p:sp>
         <p:nvSpPr>
-          <p:cNvPr id="32" name="PlaceHolder 4"/>
+          <p:cNvPr id="29" name="PlaceHolder 4"/>
           <p:cNvSpPr>
             <a:spLocks noGrp="1"/>
           </p:cNvSpPr>
@@ -270,7 +282,7 @@
         <p:spPr>
           <a:xfrm>
             <a:off x="504000" y="3044160"/>
-            <a:ext cx="4426920" cy="1568160"/>
+            <a:ext cx="4426560" cy="1568160"/>
           </a:xfrm>
           <a:prstGeom prst="rect">
             <a:avLst/>
@@ -289,7 +301,7 @@
       </p:sp>
       <p:sp>
         <p:nvSpPr>
-          <p:cNvPr id="33" name="PlaceHolder 5"/>
+          <p:cNvPr id="30" name="PlaceHolder 5"/>
           <p:cNvSpPr>
             <a:spLocks noGrp="1"/>
           </p:cNvSpPr>
@@ -299,8 +311,8 @@
         </p:nvSpPr>
         <p:spPr>
           <a:xfrm>
-            <a:off x="5152680" y="3044160"/>
-            <a:ext cx="4426920" cy="1568160"/>
+            <a:off x="5152320" y="3044160"/>
+            <a:ext cx="4426560" cy="1568160"/>
           </a:xfrm>
           <a:prstGeom prst="rect">
             <a:avLst/>
@@ -341,7 +353,7 @@
       </p:grpSpPr>
       <p:sp>
         <p:nvSpPr>
-          <p:cNvPr id="34" name="PlaceHolder 1"/>
+          <p:cNvPr id="31" name="PlaceHolder 1"/>
           <p:cNvSpPr>
             <a:spLocks noGrp="1"/>
           </p:cNvSpPr>
@@ -352,7 +364,7 @@
         <p:spPr>
           <a:xfrm>
             <a:off x="504000" y="226080"/>
-            <a:ext cx="9071640" cy="946440"/>
+            <a:ext cx="9071280" cy="946080"/>
           </a:xfrm>
           <a:prstGeom prst="rect">
             <a:avLst/>
@@ -372,7 +384,7 @@
       </p:sp>
       <p:sp>
         <p:nvSpPr>
-          <p:cNvPr id="35" name="PlaceHolder 2"/>
+          <p:cNvPr id="32" name="PlaceHolder 2"/>
           <p:cNvSpPr>
             <a:spLocks noGrp="1"/>
           </p:cNvSpPr>
@@ -402,7 +414,7 @@
       </p:sp>
       <p:sp>
         <p:nvSpPr>
-          <p:cNvPr id="36" name="PlaceHolder 3"/>
+          <p:cNvPr id="33" name="PlaceHolder 3"/>
           <p:cNvSpPr>
             <a:spLocks noGrp="1"/>
           </p:cNvSpPr>
@@ -432,7 +444,7 @@
       </p:sp>
       <p:sp>
         <p:nvSpPr>
-          <p:cNvPr id="37" name="PlaceHolder 4"/>
+          <p:cNvPr id="34" name="PlaceHolder 4"/>
           <p:cNvSpPr>
             <a:spLocks noGrp="1"/>
           </p:cNvSpPr>
@@ -462,7 +474,7 @@
       </p:sp>
       <p:sp>
         <p:nvSpPr>
-          <p:cNvPr id="38" name="PlaceHolder 5"/>
+          <p:cNvPr id="35" name="PlaceHolder 5"/>
           <p:cNvSpPr>
             <a:spLocks noGrp="1"/>
           </p:cNvSpPr>
@@ -492,7 +504,7 @@
       </p:sp>
       <p:sp>
         <p:nvSpPr>
-          <p:cNvPr id="39" name="PlaceHolder 6"/>
+          <p:cNvPr id="36" name="PlaceHolder 6"/>
           <p:cNvSpPr>
             <a:spLocks noGrp="1"/>
           </p:cNvSpPr>
@@ -522,7 +534,7 @@
       </p:sp>
       <p:sp>
         <p:nvSpPr>
-          <p:cNvPr id="40" name="PlaceHolder 7"/>
+          <p:cNvPr id="37" name="PlaceHolder 7"/>
           <p:cNvSpPr>
             <a:spLocks noGrp="1"/>
           </p:cNvSpPr>
@@ -534,6 +546,557 @@
           <a:xfrm>
             <a:off x="6638040" y="3044160"/>
             <a:ext cx="2920680" cy="1568160"/>
+          </a:xfrm>
+          <a:prstGeom prst="rect">
+            <a:avLst/>
+          </a:prstGeom>
+        </p:spPr>
+        <p:txBody>
+          <a:bodyPr lIns="0" rIns="0" tIns="0" bIns="0">
+            <a:normAutofit/>
+          </a:bodyPr>
+          <a:p>
+            <a:endParaRPr b="0" lang="en-US" sz="3200" spc="-1" strike="noStrike">
+              <a:latin typeface="Arial"/>
+            </a:endParaRPr>
+          </a:p>
+        </p:txBody>
+      </p:sp>
+    </p:spTree>
+  </p:cSld>
+</p:sldLayout>
+</file>
+
+<file path=ppt/slideLayouts/slideLayout13.xml><?xml version="1.0" encoding="utf-8"?>
+<p:sldLayout xmlns:a="http://schemas.openxmlformats.org/drawingml/2006/main" xmlns:p="http://schemas.openxmlformats.org/presentationml/2006/main" xmlns:r="http://schemas.openxmlformats.org/officeDocument/2006/relationships" xmlns:p14="http://schemas.microsoft.com/office/powerpoint/2010/main" xmlns:p15="http://schemas.microsoft.com/office/powerpoint/2012/main" xmlns:mc="http://schemas.openxmlformats.org/markup-compatibility/2006" type="blank" preserve="1">
+  <p:cSld name="Blank Slide">
+    <p:spTree>
+      <p:nvGrpSpPr>
+        <p:cNvPr id="1" name=""/>
+        <p:cNvGrpSpPr/>
+        <p:nvPr/>
+      </p:nvGrpSpPr>
+      <p:grpSpPr>
+        <a:xfrm>
+          <a:off x="0" y="0"/>
+          <a:ext cx="0" cy="0"/>
+          <a:chOff x="0" y="0"/>
+          <a:chExt cx="0" cy="0"/>
+        </a:xfrm>
+      </p:grpSpPr>
+    </p:spTree>
+  </p:cSld>
+</p:sldLayout>
+</file>
+
+<file path=ppt/slideLayouts/slideLayout14.xml><?xml version="1.0" encoding="utf-8"?>
+<p:sldLayout xmlns:a="http://schemas.openxmlformats.org/drawingml/2006/main" xmlns:p="http://schemas.openxmlformats.org/presentationml/2006/main" xmlns:r="http://schemas.openxmlformats.org/officeDocument/2006/relationships" xmlns:p14="http://schemas.microsoft.com/office/powerpoint/2010/main" xmlns:p15="http://schemas.microsoft.com/office/powerpoint/2012/main" xmlns:mc="http://schemas.openxmlformats.org/markup-compatibility/2006" type="tx" preserve="1">
+  <p:cSld name="Title Slide">
+    <p:spTree>
+      <p:nvGrpSpPr>
+        <p:cNvPr id="1" name=""/>
+        <p:cNvGrpSpPr/>
+        <p:nvPr/>
+      </p:nvGrpSpPr>
+      <p:grpSpPr>
+        <a:xfrm>
+          <a:off x="0" y="0"/>
+          <a:ext cx="0" cy="0"/>
+          <a:chOff x="0" y="0"/>
+          <a:chExt cx="0" cy="0"/>
+        </a:xfrm>
+      </p:grpSpPr>
+      <p:sp>
+        <p:nvSpPr>
+          <p:cNvPr id="40" name="PlaceHolder 1"/>
+          <p:cNvSpPr>
+            <a:spLocks noGrp="1"/>
+          </p:cNvSpPr>
+          <p:nvPr>
+            <p:ph type="title"/>
+          </p:nvPr>
+        </p:nvSpPr>
+        <p:spPr>
+          <a:xfrm>
+            <a:off x="504000" y="226080"/>
+            <a:ext cx="9071280" cy="946080"/>
+          </a:xfrm>
+          <a:prstGeom prst="rect">
+            <a:avLst/>
+          </a:prstGeom>
+        </p:spPr>
+        <p:txBody>
+          <a:bodyPr lIns="0" rIns="0" tIns="0" bIns="0" anchor="ctr">
+            <a:noAutofit/>
+          </a:bodyPr>
+          <a:p>
+            <a:pPr algn="ctr"/>
+            <a:endParaRPr b="0" lang="en-US" sz="4400" spc="-1" strike="noStrike">
+              <a:latin typeface="Arial"/>
+            </a:endParaRPr>
+          </a:p>
+        </p:txBody>
+      </p:sp>
+      <p:sp>
+        <p:nvSpPr>
+          <p:cNvPr id="41" name="PlaceHolder 2"/>
+          <p:cNvSpPr>
+            <a:spLocks noGrp="1"/>
+          </p:cNvSpPr>
+          <p:nvPr>
+            <p:ph type="subTitle"/>
+          </p:nvPr>
+        </p:nvSpPr>
+        <p:spPr>
+          <a:xfrm>
+            <a:off x="504000" y="1326600"/>
+            <a:ext cx="9071280" cy="3287880"/>
+          </a:xfrm>
+          <a:prstGeom prst="rect">
+            <a:avLst/>
+          </a:prstGeom>
+        </p:spPr>
+        <p:txBody>
+          <a:bodyPr lIns="0" rIns="0" tIns="0" bIns="0" anchor="ctr">
+            <a:noAutofit/>
+          </a:bodyPr>
+          <a:p>
+            <a:pPr algn="ctr"/>
+            <a:endParaRPr b="0" lang="en-US" sz="3200" spc="-1" strike="noStrike">
+              <a:latin typeface="Arial"/>
+            </a:endParaRPr>
+          </a:p>
+        </p:txBody>
+      </p:sp>
+    </p:spTree>
+  </p:cSld>
+</p:sldLayout>
+</file>
+
+<file path=ppt/slideLayouts/slideLayout15.xml><?xml version="1.0" encoding="utf-8"?>
+<p:sldLayout xmlns:a="http://schemas.openxmlformats.org/drawingml/2006/main" xmlns:p="http://schemas.openxmlformats.org/presentationml/2006/main" xmlns:r="http://schemas.openxmlformats.org/officeDocument/2006/relationships" xmlns:p14="http://schemas.microsoft.com/office/powerpoint/2010/main" xmlns:p15="http://schemas.microsoft.com/office/powerpoint/2012/main" xmlns:mc="http://schemas.openxmlformats.org/markup-compatibility/2006" type="obj" preserve="1">
+  <p:cSld name="Title, Content">
+    <p:spTree>
+      <p:nvGrpSpPr>
+        <p:cNvPr id="1" name=""/>
+        <p:cNvGrpSpPr/>
+        <p:nvPr/>
+      </p:nvGrpSpPr>
+      <p:grpSpPr>
+        <a:xfrm>
+          <a:off x="0" y="0"/>
+          <a:ext cx="0" cy="0"/>
+          <a:chOff x="0" y="0"/>
+          <a:chExt cx="0" cy="0"/>
+        </a:xfrm>
+      </p:grpSpPr>
+      <p:sp>
+        <p:nvSpPr>
+          <p:cNvPr id="42" name="PlaceHolder 1"/>
+          <p:cNvSpPr>
+            <a:spLocks noGrp="1"/>
+          </p:cNvSpPr>
+          <p:nvPr>
+            <p:ph type="title"/>
+          </p:nvPr>
+        </p:nvSpPr>
+        <p:spPr>
+          <a:xfrm>
+            <a:off x="504000" y="226080"/>
+            <a:ext cx="9071280" cy="946080"/>
+          </a:xfrm>
+          <a:prstGeom prst="rect">
+            <a:avLst/>
+          </a:prstGeom>
+        </p:spPr>
+        <p:txBody>
+          <a:bodyPr lIns="0" rIns="0" tIns="0" bIns="0" anchor="ctr">
+            <a:noAutofit/>
+          </a:bodyPr>
+          <a:p>
+            <a:pPr algn="ctr"/>
+            <a:endParaRPr b="0" lang="en-US" sz="4400" spc="-1" strike="noStrike">
+              <a:latin typeface="Arial"/>
+            </a:endParaRPr>
+          </a:p>
+        </p:txBody>
+      </p:sp>
+      <p:sp>
+        <p:nvSpPr>
+          <p:cNvPr id="43" name="PlaceHolder 2"/>
+          <p:cNvSpPr>
+            <a:spLocks noGrp="1"/>
+          </p:cNvSpPr>
+          <p:nvPr>
+            <p:ph type="body"/>
+          </p:nvPr>
+        </p:nvSpPr>
+        <p:spPr>
+          <a:xfrm>
+            <a:off x="504000" y="1326600"/>
+            <a:ext cx="9071280" cy="3287880"/>
+          </a:xfrm>
+          <a:prstGeom prst="rect">
+            <a:avLst/>
+          </a:prstGeom>
+        </p:spPr>
+        <p:txBody>
+          <a:bodyPr lIns="0" rIns="0" tIns="0" bIns="0">
+            <a:normAutofit/>
+          </a:bodyPr>
+          <a:p>
+            <a:endParaRPr b="0" lang="en-US" sz="3200" spc="-1" strike="noStrike">
+              <a:latin typeface="Arial"/>
+            </a:endParaRPr>
+          </a:p>
+        </p:txBody>
+      </p:sp>
+    </p:spTree>
+  </p:cSld>
+</p:sldLayout>
+</file>
+
+<file path=ppt/slideLayouts/slideLayout16.xml><?xml version="1.0" encoding="utf-8"?>
+<p:sldLayout xmlns:a="http://schemas.openxmlformats.org/drawingml/2006/main" xmlns:p="http://schemas.openxmlformats.org/presentationml/2006/main" xmlns:r="http://schemas.openxmlformats.org/officeDocument/2006/relationships" xmlns:p14="http://schemas.microsoft.com/office/powerpoint/2010/main" xmlns:p15="http://schemas.microsoft.com/office/powerpoint/2012/main" xmlns:mc="http://schemas.openxmlformats.org/markup-compatibility/2006" type="twoObj" preserve="1">
+  <p:cSld name="Title, 2 Content">
+    <p:spTree>
+      <p:nvGrpSpPr>
+        <p:cNvPr id="1" name=""/>
+        <p:cNvGrpSpPr/>
+        <p:nvPr/>
+      </p:nvGrpSpPr>
+      <p:grpSpPr>
+        <a:xfrm>
+          <a:off x="0" y="0"/>
+          <a:ext cx="0" cy="0"/>
+          <a:chOff x="0" y="0"/>
+          <a:chExt cx="0" cy="0"/>
+        </a:xfrm>
+      </p:grpSpPr>
+      <p:sp>
+        <p:nvSpPr>
+          <p:cNvPr id="44" name="PlaceHolder 1"/>
+          <p:cNvSpPr>
+            <a:spLocks noGrp="1"/>
+          </p:cNvSpPr>
+          <p:nvPr>
+            <p:ph type="title"/>
+          </p:nvPr>
+        </p:nvSpPr>
+        <p:spPr>
+          <a:xfrm>
+            <a:off x="504000" y="226080"/>
+            <a:ext cx="9071280" cy="946080"/>
+          </a:xfrm>
+          <a:prstGeom prst="rect">
+            <a:avLst/>
+          </a:prstGeom>
+        </p:spPr>
+        <p:txBody>
+          <a:bodyPr lIns="0" rIns="0" tIns="0" bIns="0" anchor="ctr">
+            <a:noAutofit/>
+          </a:bodyPr>
+          <a:p>
+            <a:pPr algn="ctr"/>
+            <a:endParaRPr b="0" lang="en-US" sz="4400" spc="-1" strike="noStrike">
+              <a:latin typeface="Arial"/>
+            </a:endParaRPr>
+          </a:p>
+        </p:txBody>
+      </p:sp>
+      <p:sp>
+        <p:nvSpPr>
+          <p:cNvPr id="45" name="PlaceHolder 2"/>
+          <p:cNvSpPr>
+            <a:spLocks noGrp="1"/>
+          </p:cNvSpPr>
+          <p:nvPr>
+            <p:ph type="body"/>
+          </p:nvPr>
+        </p:nvSpPr>
+        <p:spPr>
+          <a:xfrm>
+            <a:off x="504000" y="1326600"/>
+            <a:ext cx="4426560" cy="3287880"/>
+          </a:xfrm>
+          <a:prstGeom prst="rect">
+            <a:avLst/>
+          </a:prstGeom>
+        </p:spPr>
+        <p:txBody>
+          <a:bodyPr lIns="0" rIns="0" tIns="0" bIns="0">
+            <a:normAutofit/>
+          </a:bodyPr>
+          <a:p>
+            <a:endParaRPr b="0" lang="en-US" sz="3200" spc="-1" strike="noStrike">
+              <a:latin typeface="Arial"/>
+            </a:endParaRPr>
+          </a:p>
+        </p:txBody>
+      </p:sp>
+      <p:sp>
+        <p:nvSpPr>
+          <p:cNvPr id="46" name="PlaceHolder 3"/>
+          <p:cNvSpPr>
+            <a:spLocks noGrp="1"/>
+          </p:cNvSpPr>
+          <p:nvPr>
+            <p:ph type="body"/>
+          </p:nvPr>
+        </p:nvSpPr>
+        <p:spPr>
+          <a:xfrm>
+            <a:off x="5152320" y="1326600"/>
+            <a:ext cx="4426560" cy="3287880"/>
+          </a:xfrm>
+          <a:prstGeom prst="rect">
+            <a:avLst/>
+          </a:prstGeom>
+        </p:spPr>
+        <p:txBody>
+          <a:bodyPr lIns="0" rIns="0" tIns="0" bIns="0">
+            <a:normAutofit/>
+          </a:bodyPr>
+          <a:p>
+            <a:endParaRPr b="0" lang="en-US" sz="3200" spc="-1" strike="noStrike">
+              <a:latin typeface="Arial"/>
+            </a:endParaRPr>
+          </a:p>
+        </p:txBody>
+      </p:sp>
+    </p:spTree>
+  </p:cSld>
+</p:sldLayout>
+</file>
+
+<file path=ppt/slideLayouts/slideLayout17.xml><?xml version="1.0" encoding="utf-8"?>
+<p:sldLayout xmlns:a="http://schemas.openxmlformats.org/drawingml/2006/main" xmlns:p="http://schemas.openxmlformats.org/presentationml/2006/main" xmlns:r="http://schemas.openxmlformats.org/officeDocument/2006/relationships" xmlns:p14="http://schemas.microsoft.com/office/powerpoint/2010/main" xmlns:p15="http://schemas.microsoft.com/office/powerpoint/2012/main" xmlns:mc="http://schemas.openxmlformats.org/markup-compatibility/2006" type="titleOnly" preserve="1">
+  <p:cSld name="Title Only">
+    <p:spTree>
+      <p:nvGrpSpPr>
+        <p:cNvPr id="1" name=""/>
+        <p:cNvGrpSpPr/>
+        <p:nvPr/>
+      </p:nvGrpSpPr>
+      <p:grpSpPr>
+        <a:xfrm>
+          <a:off x="0" y="0"/>
+          <a:ext cx="0" cy="0"/>
+          <a:chOff x="0" y="0"/>
+          <a:chExt cx="0" cy="0"/>
+        </a:xfrm>
+      </p:grpSpPr>
+      <p:sp>
+        <p:nvSpPr>
+          <p:cNvPr id="47" name="PlaceHolder 1"/>
+          <p:cNvSpPr>
+            <a:spLocks noGrp="1"/>
+          </p:cNvSpPr>
+          <p:nvPr>
+            <p:ph type="title"/>
+          </p:nvPr>
+        </p:nvSpPr>
+        <p:spPr>
+          <a:xfrm>
+            <a:off x="504000" y="226080"/>
+            <a:ext cx="9071280" cy="946080"/>
+          </a:xfrm>
+          <a:prstGeom prst="rect">
+            <a:avLst/>
+          </a:prstGeom>
+        </p:spPr>
+        <p:txBody>
+          <a:bodyPr lIns="0" rIns="0" tIns="0" bIns="0" anchor="ctr">
+            <a:noAutofit/>
+          </a:bodyPr>
+          <a:p>
+            <a:pPr algn="ctr"/>
+            <a:endParaRPr b="0" lang="en-US" sz="4400" spc="-1" strike="noStrike">
+              <a:latin typeface="Arial"/>
+            </a:endParaRPr>
+          </a:p>
+        </p:txBody>
+      </p:sp>
+    </p:spTree>
+  </p:cSld>
+</p:sldLayout>
+</file>
+
+<file path=ppt/slideLayouts/slideLayout18.xml><?xml version="1.0" encoding="utf-8"?>
+<p:sldLayout xmlns:a="http://schemas.openxmlformats.org/drawingml/2006/main" xmlns:p="http://schemas.openxmlformats.org/presentationml/2006/main" xmlns:r="http://schemas.openxmlformats.org/officeDocument/2006/relationships" xmlns:p14="http://schemas.microsoft.com/office/powerpoint/2010/main" xmlns:p15="http://schemas.microsoft.com/office/powerpoint/2012/main" xmlns:mc="http://schemas.openxmlformats.org/markup-compatibility/2006" type="objOnly" preserve="1">
+  <p:cSld name="Centered Text">
+    <p:spTree>
+      <p:nvGrpSpPr>
+        <p:cNvPr id="1" name=""/>
+        <p:cNvGrpSpPr/>
+        <p:nvPr/>
+      </p:nvGrpSpPr>
+      <p:grpSpPr>
+        <a:xfrm>
+          <a:off x="0" y="0"/>
+          <a:ext cx="0" cy="0"/>
+          <a:chOff x="0" y="0"/>
+          <a:chExt cx="0" cy="0"/>
+        </a:xfrm>
+      </p:grpSpPr>
+      <p:sp>
+        <p:nvSpPr>
+          <p:cNvPr id="48" name="PlaceHolder 1"/>
+          <p:cNvSpPr>
+            <a:spLocks noGrp="1"/>
+          </p:cNvSpPr>
+          <p:nvPr>
+            <p:ph type="subTitle"/>
+          </p:nvPr>
+        </p:nvSpPr>
+        <p:spPr>
+          <a:xfrm>
+            <a:off x="504000" y="226080"/>
+            <a:ext cx="9071280" cy="4386600"/>
+          </a:xfrm>
+          <a:prstGeom prst="rect">
+            <a:avLst/>
+          </a:prstGeom>
+        </p:spPr>
+        <p:txBody>
+          <a:bodyPr lIns="0" rIns="0" tIns="0" bIns="0" anchor="ctr">
+            <a:noAutofit/>
+          </a:bodyPr>
+          <a:p>
+            <a:pPr algn="ctr"/>
+            <a:endParaRPr b="0" lang="en-US" sz="3200" spc="-1" strike="noStrike">
+              <a:latin typeface="Arial"/>
+            </a:endParaRPr>
+          </a:p>
+        </p:txBody>
+      </p:sp>
+    </p:spTree>
+  </p:cSld>
+</p:sldLayout>
+</file>
+
+<file path=ppt/slideLayouts/slideLayout19.xml><?xml version="1.0" encoding="utf-8"?>
+<p:sldLayout xmlns:a="http://schemas.openxmlformats.org/drawingml/2006/main" xmlns:p="http://schemas.openxmlformats.org/presentationml/2006/main" xmlns:r="http://schemas.openxmlformats.org/officeDocument/2006/relationships" xmlns:p14="http://schemas.microsoft.com/office/powerpoint/2010/main" xmlns:p15="http://schemas.microsoft.com/office/powerpoint/2012/main" xmlns:mc="http://schemas.openxmlformats.org/markup-compatibility/2006" type="twoObjAndObj" preserve="1">
+  <p:cSld name="Title, 2 Content and Content">
+    <p:spTree>
+      <p:nvGrpSpPr>
+        <p:cNvPr id="1" name=""/>
+        <p:cNvGrpSpPr/>
+        <p:nvPr/>
+      </p:nvGrpSpPr>
+      <p:grpSpPr>
+        <a:xfrm>
+          <a:off x="0" y="0"/>
+          <a:ext cx="0" cy="0"/>
+          <a:chOff x="0" y="0"/>
+          <a:chExt cx="0" cy="0"/>
+        </a:xfrm>
+      </p:grpSpPr>
+      <p:sp>
+        <p:nvSpPr>
+          <p:cNvPr id="49" name="PlaceHolder 1"/>
+          <p:cNvSpPr>
+            <a:spLocks noGrp="1"/>
+          </p:cNvSpPr>
+          <p:nvPr>
+            <p:ph type="title"/>
+          </p:nvPr>
+        </p:nvSpPr>
+        <p:spPr>
+          <a:xfrm>
+            <a:off x="504000" y="226080"/>
+            <a:ext cx="9071280" cy="946080"/>
+          </a:xfrm>
+          <a:prstGeom prst="rect">
+            <a:avLst/>
+          </a:prstGeom>
+        </p:spPr>
+        <p:txBody>
+          <a:bodyPr lIns="0" rIns="0" tIns="0" bIns="0" anchor="ctr">
+            <a:noAutofit/>
+          </a:bodyPr>
+          <a:p>
+            <a:pPr algn="ctr"/>
+            <a:endParaRPr b="0" lang="en-US" sz="4400" spc="-1" strike="noStrike">
+              <a:latin typeface="Arial"/>
+            </a:endParaRPr>
+          </a:p>
+        </p:txBody>
+      </p:sp>
+      <p:sp>
+        <p:nvSpPr>
+          <p:cNvPr id="50" name="PlaceHolder 2"/>
+          <p:cNvSpPr>
+            <a:spLocks noGrp="1"/>
+          </p:cNvSpPr>
+          <p:nvPr>
+            <p:ph type="body"/>
+          </p:nvPr>
+        </p:nvSpPr>
+        <p:spPr>
+          <a:xfrm>
+            <a:off x="504000" y="1326600"/>
+            <a:ext cx="4426560" cy="1568160"/>
+          </a:xfrm>
+          <a:prstGeom prst="rect">
+            <a:avLst/>
+          </a:prstGeom>
+        </p:spPr>
+        <p:txBody>
+          <a:bodyPr lIns="0" rIns="0" tIns="0" bIns="0">
+            <a:normAutofit/>
+          </a:bodyPr>
+          <a:p>
+            <a:endParaRPr b="0" lang="en-US" sz="3200" spc="-1" strike="noStrike">
+              <a:latin typeface="Arial"/>
+            </a:endParaRPr>
+          </a:p>
+        </p:txBody>
+      </p:sp>
+      <p:sp>
+        <p:nvSpPr>
+          <p:cNvPr id="51" name="PlaceHolder 3"/>
+          <p:cNvSpPr>
+            <a:spLocks noGrp="1"/>
+          </p:cNvSpPr>
+          <p:nvPr>
+            <p:ph type="body"/>
+          </p:nvPr>
+        </p:nvSpPr>
+        <p:spPr>
+          <a:xfrm>
+            <a:off x="5152320" y="1326600"/>
+            <a:ext cx="4426560" cy="3287880"/>
+          </a:xfrm>
+          <a:prstGeom prst="rect">
+            <a:avLst/>
+          </a:prstGeom>
+        </p:spPr>
+        <p:txBody>
+          <a:bodyPr lIns="0" rIns="0" tIns="0" bIns="0">
+            <a:normAutofit/>
+          </a:bodyPr>
+          <a:p>
+            <a:endParaRPr b="0" lang="en-US" sz="3200" spc="-1" strike="noStrike">
+              <a:latin typeface="Arial"/>
+            </a:endParaRPr>
+          </a:p>
+        </p:txBody>
+      </p:sp>
+      <p:sp>
+        <p:nvSpPr>
+          <p:cNvPr id="52" name="PlaceHolder 4"/>
+          <p:cNvSpPr>
+            <a:spLocks noGrp="1"/>
+          </p:cNvSpPr>
+          <p:nvPr>
+            <p:ph type="body"/>
+          </p:nvPr>
+        </p:nvSpPr>
+        <p:spPr>
+          <a:xfrm>
+            <a:off x="504000" y="3044160"/>
+            <a:ext cx="4426560" cy="1568160"/>
           </a:xfrm>
           <a:prstGeom prst="rect">
             <a:avLst/>
@@ -574,7 +1137,7 @@
       </p:grpSpPr>
       <p:sp>
         <p:nvSpPr>
-          <p:cNvPr id="5" name="PlaceHolder 1"/>
+          <p:cNvPr id="2" name="PlaceHolder 1"/>
           <p:cNvSpPr>
             <a:spLocks noGrp="1"/>
           </p:cNvSpPr>
@@ -585,7 +1148,7 @@
         <p:spPr>
           <a:xfrm>
             <a:off x="504000" y="226080"/>
-            <a:ext cx="9071640" cy="946440"/>
+            <a:ext cx="9071280" cy="946080"/>
           </a:xfrm>
           <a:prstGeom prst="rect">
             <a:avLst/>
@@ -605,7 +1168,7 @@
       </p:sp>
       <p:sp>
         <p:nvSpPr>
-          <p:cNvPr id="6" name="PlaceHolder 2"/>
+          <p:cNvPr id="3" name="PlaceHolder 2"/>
           <p:cNvSpPr>
             <a:spLocks noGrp="1"/>
           </p:cNvSpPr>
@@ -616,7 +1179,7 @@
         <p:spPr>
           <a:xfrm>
             <a:off x="504000" y="1326600"/>
-            <a:ext cx="9071640" cy="3288240"/>
+            <a:ext cx="9071280" cy="3287880"/>
           </a:xfrm>
           <a:prstGeom prst="rect">
             <a:avLst/>
@@ -628,6 +1191,811 @@
           </a:bodyPr>
           <a:p>
             <a:pPr algn="ctr"/>
+            <a:endParaRPr b="0" lang="en-US" sz="3200" spc="-1" strike="noStrike">
+              <a:latin typeface="Arial"/>
+            </a:endParaRPr>
+          </a:p>
+        </p:txBody>
+      </p:sp>
+    </p:spTree>
+  </p:cSld>
+</p:sldLayout>
+</file>
+
+<file path=ppt/slideLayouts/slideLayout20.xml><?xml version="1.0" encoding="utf-8"?>
+<p:sldLayout xmlns:a="http://schemas.openxmlformats.org/drawingml/2006/main" xmlns:p="http://schemas.openxmlformats.org/presentationml/2006/main" xmlns:r="http://schemas.openxmlformats.org/officeDocument/2006/relationships" xmlns:p14="http://schemas.microsoft.com/office/powerpoint/2010/main" xmlns:p15="http://schemas.microsoft.com/office/powerpoint/2012/main" xmlns:mc="http://schemas.openxmlformats.org/markup-compatibility/2006" type="objAndTwoObj" preserve="1">
+  <p:cSld name="Title Content and 2 Content">
+    <p:spTree>
+      <p:nvGrpSpPr>
+        <p:cNvPr id="1" name=""/>
+        <p:cNvGrpSpPr/>
+        <p:nvPr/>
+      </p:nvGrpSpPr>
+      <p:grpSpPr>
+        <a:xfrm>
+          <a:off x="0" y="0"/>
+          <a:ext cx="0" cy="0"/>
+          <a:chOff x="0" y="0"/>
+          <a:chExt cx="0" cy="0"/>
+        </a:xfrm>
+      </p:grpSpPr>
+      <p:sp>
+        <p:nvSpPr>
+          <p:cNvPr id="53" name="PlaceHolder 1"/>
+          <p:cNvSpPr>
+            <a:spLocks noGrp="1"/>
+          </p:cNvSpPr>
+          <p:nvPr>
+            <p:ph type="title"/>
+          </p:nvPr>
+        </p:nvSpPr>
+        <p:spPr>
+          <a:xfrm>
+            <a:off x="504000" y="226080"/>
+            <a:ext cx="9071280" cy="946080"/>
+          </a:xfrm>
+          <a:prstGeom prst="rect">
+            <a:avLst/>
+          </a:prstGeom>
+        </p:spPr>
+        <p:txBody>
+          <a:bodyPr lIns="0" rIns="0" tIns="0" bIns="0" anchor="ctr">
+            <a:noAutofit/>
+          </a:bodyPr>
+          <a:p>
+            <a:pPr algn="ctr"/>
+            <a:endParaRPr b="0" lang="en-US" sz="4400" spc="-1" strike="noStrike">
+              <a:latin typeface="Arial"/>
+            </a:endParaRPr>
+          </a:p>
+        </p:txBody>
+      </p:sp>
+      <p:sp>
+        <p:nvSpPr>
+          <p:cNvPr id="54" name="PlaceHolder 2"/>
+          <p:cNvSpPr>
+            <a:spLocks noGrp="1"/>
+          </p:cNvSpPr>
+          <p:nvPr>
+            <p:ph type="body"/>
+          </p:nvPr>
+        </p:nvSpPr>
+        <p:spPr>
+          <a:xfrm>
+            <a:off x="504000" y="1326600"/>
+            <a:ext cx="4426560" cy="3287880"/>
+          </a:xfrm>
+          <a:prstGeom prst="rect">
+            <a:avLst/>
+          </a:prstGeom>
+        </p:spPr>
+        <p:txBody>
+          <a:bodyPr lIns="0" rIns="0" tIns="0" bIns="0">
+            <a:normAutofit/>
+          </a:bodyPr>
+          <a:p>
+            <a:endParaRPr b="0" lang="en-US" sz="3200" spc="-1" strike="noStrike">
+              <a:latin typeface="Arial"/>
+            </a:endParaRPr>
+          </a:p>
+        </p:txBody>
+      </p:sp>
+      <p:sp>
+        <p:nvSpPr>
+          <p:cNvPr id="55" name="PlaceHolder 3"/>
+          <p:cNvSpPr>
+            <a:spLocks noGrp="1"/>
+          </p:cNvSpPr>
+          <p:nvPr>
+            <p:ph type="body"/>
+          </p:nvPr>
+        </p:nvSpPr>
+        <p:spPr>
+          <a:xfrm>
+            <a:off x="5152320" y="1326600"/>
+            <a:ext cx="4426560" cy="1568160"/>
+          </a:xfrm>
+          <a:prstGeom prst="rect">
+            <a:avLst/>
+          </a:prstGeom>
+        </p:spPr>
+        <p:txBody>
+          <a:bodyPr lIns="0" rIns="0" tIns="0" bIns="0">
+            <a:normAutofit/>
+          </a:bodyPr>
+          <a:p>
+            <a:endParaRPr b="0" lang="en-US" sz="3200" spc="-1" strike="noStrike">
+              <a:latin typeface="Arial"/>
+            </a:endParaRPr>
+          </a:p>
+        </p:txBody>
+      </p:sp>
+      <p:sp>
+        <p:nvSpPr>
+          <p:cNvPr id="56" name="PlaceHolder 4"/>
+          <p:cNvSpPr>
+            <a:spLocks noGrp="1"/>
+          </p:cNvSpPr>
+          <p:nvPr>
+            <p:ph type="body"/>
+          </p:nvPr>
+        </p:nvSpPr>
+        <p:spPr>
+          <a:xfrm>
+            <a:off x="5152320" y="3044160"/>
+            <a:ext cx="4426560" cy="1568160"/>
+          </a:xfrm>
+          <a:prstGeom prst="rect">
+            <a:avLst/>
+          </a:prstGeom>
+        </p:spPr>
+        <p:txBody>
+          <a:bodyPr lIns="0" rIns="0" tIns="0" bIns="0">
+            <a:normAutofit/>
+          </a:bodyPr>
+          <a:p>
+            <a:endParaRPr b="0" lang="en-US" sz="3200" spc="-1" strike="noStrike">
+              <a:latin typeface="Arial"/>
+            </a:endParaRPr>
+          </a:p>
+        </p:txBody>
+      </p:sp>
+    </p:spTree>
+  </p:cSld>
+</p:sldLayout>
+</file>
+
+<file path=ppt/slideLayouts/slideLayout21.xml><?xml version="1.0" encoding="utf-8"?>
+<p:sldLayout xmlns:a="http://schemas.openxmlformats.org/drawingml/2006/main" xmlns:p="http://schemas.openxmlformats.org/presentationml/2006/main" xmlns:r="http://schemas.openxmlformats.org/officeDocument/2006/relationships" xmlns:p14="http://schemas.microsoft.com/office/powerpoint/2010/main" xmlns:p15="http://schemas.microsoft.com/office/powerpoint/2012/main" xmlns:mc="http://schemas.openxmlformats.org/markup-compatibility/2006" type="twoObjOverTx" preserve="1">
+  <p:cSld name="Title, 2 Content over Content">
+    <p:spTree>
+      <p:nvGrpSpPr>
+        <p:cNvPr id="1" name=""/>
+        <p:cNvGrpSpPr/>
+        <p:nvPr/>
+      </p:nvGrpSpPr>
+      <p:grpSpPr>
+        <a:xfrm>
+          <a:off x="0" y="0"/>
+          <a:ext cx="0" cy="0"/>
+          <a:chOff x="0" y="0"/>
+          <a:chExt cx="0" cy="0"/>
+        </a:xfrm>
+      </p:grpSpPr>
+      <p:sp>
+        <p:nvSpPr>
+          <p:cNvPr id="57" name="PlaceHolder 1"/>
+          <p:cNvSpPr>
+            <a:spLocks noGrp="1"/>
+          </p:cNvSpPr>
+          <p:nvPr>
+            <p:ph type="title"/>
+          </p:nvPr>
+        </p:nvSpPr>
+        <p:spPr>
+          <a:xfrm>
+            <a:off x="504000" y="226080"/>
+            <a:ext cx="9071280" cy="946080"/>
+          </a:xfrm>
+          <a:prstGeom prst="rect">
+            <a:avLst/>
+          </a:prstGeom>
+        </p:spPr>
+        <p:txBody>
+          <a:bodyPr lIns="0" rIns="0" tIns="0" bIns="0" anchor="ctr">
+            <a:noAutofit/>
+          </a:bodyPr>
+          <a:p>
+            <a:pPr algn="ctr"/>
+            <a:endParaRPr b="0" lang="en-US" sz="4400" spc="-1" strike="noStrike">
+              <a:latin typeface="Arial"/>
+            </a:endParaRPr>
+          </a:p>
+        </p:txBody>
+      </p:sp>
+      <p:sp>
+        <p:nvSpPr>
+          <p:cNvPr id="58" name="PlaceHolder 2"/>
+          <p:cNvSpPr>
+            <a:spLocks noGrp="1"/>
+          </p:cNvSpPr>
+          <p:nvPr>
+            <p:ph type="body"/>
+          </p:nvPr>
+        </p:nvSpPr>
+        <p:spPr>
+          <a:xfrm>
+            <a:off x="504000" y="1326600"/>
+            <a:ext cx="4426560" cy="1568160"/>
+          </a:xfrm>
+          <a:prstGeom prst="rect">
+            <a:avLst/>
+          </a:prstGeom>
+        </p:spPr>
+        <p:txBody>
+          <a:bodyPr lIns="0" rIns="0" tIns="0" bIns="0">
+            <a:normAutofit/>
+          </a:bodyPr>
+          <a:p>
+            <a:endParaRPr b="0" lang="en-US" sz="3200" spc="-1" strike="noStrike">
+              <a:latin typeface="Arial"/>
+            </a:endParaRPr>
+          </a:p>
+        </p:txBody>
+      </p:sp>
+      <p:sp>
+        <p:nvSpPr>
+          <p:cNvPr id="59" name="PlaceHolder 3"/>
+          <p:cNvSpPr>
+            <a:spLocks noGrp="1"/>
+          </p:cNvSpPr>
+          <p:nvPr>
+            <p:ph type="body"/>
+          </p:nvPr>
+        </p:nvSpPr>
+        <p:spPr>
+          <a:xfrm>
+            <a:off x="5152320" y="1326600"/>
+            <a:ext cx="4426560" cy="1568160"/>
+          </a:xfrm>
+          <a:prstGeom prst="rect">
+            <a:avLst/>
+          </a:prstGeom>
+        </p:spPr>
+        <p:txBody>
+          <a:bodyPr lIns="0" rIns="0" tIns="0" bIns="0">
+            <a:normAutofit/>
+          </a:bodyPr>
+          <a:p>
+            <a:endParaRPr b="0" lang="en-US" sz="3200" spc="-1" strike="noStrike">
+              <a:latin typeface="Arial"/>
+            </a:endParaRPr>
+          </a:p>
+        </p:txBody>
+      </p:sp>
+      <p:sp>
+        <p:nvSpPr>
+          <p:cNvPr id="60" name="PlaceHolder 4"/>
+          <p:cNvSpPr>
+            <a:spLocks noGrp="1"/>
+          </p:cNvSpPr>
+          <p:nvPr>
+            <p:ph type="body"/>
+          </p:nvPr>
+        </p:nvSpPr>
+        <p:spPr>
+          <a:xfrm>
+            <a:off x="504000" y="3044160"/>
+            <a:ext cx="9071280" cy="1568160"/>
+          </a:xfrm>
+          <a:prstGeom prst="rect">
+            <a:avLst/>
+          </a:prstGeom>
+        </p:spPr>
+        <p:txBody>
+          <a:bodyPr lIns="0" rIns="0" tIns="0" bIns="0">
+            <a:normAutofit/>
+          </a:bodyPr>
+          <a:p>
+            <a:endParaRPr b="0" lang="en-US" sz="3200" spc="-1" strike="noStrike">
+              <a:latin typeface="Arial"/>
+            </a:endParaRPr>
+          </a:p>
+        </p:txBody>
+      </p:sp>
+    </p:spTree>
+  </p:cSld>
+</p:sldLayout>
+</file>
+
+<file path=ppt/slideLayouts/slideLayout22.xml><?xml version="1.0" encoding="utf-8"?>
+<p:sldLayout xmlns:a="http://schemas.openxmlformats.org/drawingml/2006/main" xmlns:p="http://schemas.openxmlformats.org/presentationml/2006/main" xmlns:r="http://schemas.openxmlformats.org/officeDocument/2006/relationships" xmlns:p14="http://schemas.microsoft.com/office/powerpoint/2010/main" xmlns:p15="http://schemas.microsoft.com/office/powerpoint/2012/main" xmlns:mc="http://schemas.openxmlformats.org/markup-compatibility/2006" type="objOverTx" preserve="1">
+  <p:cSld name="Title, Content over Content">
+    <p:spTree>
+      <p:nvGrpSpPr>
+        <p:cNvPr id="1" name=""/>
+        <p:cNvGrpSpPr/>
+        <p:nvPr/>
+      </p:nvGrpSpPr>
+      <p:grpSpPr>
+        <a:xfrm>
+          <a:off x="0" y="0"/>
+          <a:ext cx="0" cy="0"/>
+          <a:chOff x="0" y="0"/>
+          <a:chExt cx="0" cy="0"/>
+        </a:xfrm>
+      </p:grpSpPr>
+      <p:sp>
+        <p:nvSpPr>
+          <p:cNvPr id="61" name="PlaceHolder 1"/>
+          <p:cNvSpPr>
+            <a:spLocks noGrp="1"/>
+          </p:cNvSpPr>
+          <p:nvPr>
+            <p:ph type="title"/>
+          </p:nvPr>
+        </p:nvSpPr>
+        <p:spPr>
+          <a:xfrm>
+            <a:off x="504000" y="226080"/>
+            <a:ext cx="9071280" cy="946080"/>
+          </a:xfrm>
+          <a:prstGeom prst="rect">
+            <a:avLst/>
+          </a:prstGeom>
+        </p:spPr>
+        <p:txBody>
+          <a:bodyPr lIns="0" rIns="0" tIns="0" bIns="0" anchor="ctr">
+            <a:noAutofit/>
+          </a:bodyPr>
+          <a:p>
+            <a:pPr algn="ctr"/>
+            <a:endParaRPr b="0" lang="en-US" sz="4400" spc="-1" strike="noStrike">
+              <a:latin typeface="Arial"/>
+            </a:endParaRPr>
+          </a:p>
+        </p:txBody>
+      </p:sp>
+      <p:sp>
+        <p:nvSpPr>
+          <p:cNvPr id="62" name="PlaceHolder 2"/>
+          <p:cNvSpPr>
+            <a:spLocks noGrp="1"/>
+          </p:cNvSpPr>
+          <p:nvPr>
+            <p:ph type="body"/>
+          </p:nvPr>
+        </p:nvSpPr>
+        <p:spPr>
+          <a:xfrm>
+            <a:off x="504000" y="1326600"/>
+            <a:ext cx="9071280" cy="1568160"/>
+          </a:xfrm>
+          <a:prstGeom prst="rect">
+            <a:avLst/>
+          </a:prstGeom>
+        </p:spPr>
+        <p:txBody>
+          <a:bodyPr lIns="0" rIns="0" tIns="0" bIns="0">
+            <a:normAutofit/>
+          </a:bodyPr>
+          <a:p>
+            <a:endParaRPr b="0" lang="en-US" sz="3200" spc="-1" strike="noStrike">
+              <a:latin typeface="Arial"/>
+            </a:endParaRPr>
+          </a:p>
+        </p:txBody>
+      </p:sp>
+      <p:sp>
+        <p:nvSpPr>
+          <p:cNvPr id="63" name="PlaceHolder 3"/>
+          <p:cNvSpPr>
+            <a:spLocks noGrp="1"/>
+          </p:cNvSpPr>
+          <p:nvPr>
+            <p:ph type="body"/>
+          </p:nvPr>
+        </p:nvSpPr>
+        <p:spPr>
+          <a:xfrm>
+            <a:off x="504000" y="3044160"/>
+            <a:ext cx="9071280" cy="1568160"/>
+          </a:xfrm>
+          <a:prstGeom prst="rect">
+            <a:avLst/>
+          </a:prstGeom>
+        </p:spPr>
+        <p:txBody>
+          <a:bodyPr lIns="0" rIns="0" tIns="0" bIns="0">
+            <a:normAutofit/>
+          </a:bodyPr>
+          <a:p>
+            <a:endParaRPr b="0" lang="en-US" sz="3200" spc="-1" strike="noStrike">
+              <a:latin typeface="Arial"/>
+            </a:endParaRPr>
+          </a:p>
+        </p:txBody>
+      </p:sp>
+    </p:spTree>
+  </p:cSld>
+</p:sldLayout>
+</file>
+
+<file path=ppt/slideLayouts/slideLayout23.xml><?xml version="1.0" encoding="utf-8"?>
+<p:sldLayout xmlns:a="http://schemas.openxmlformats.org/drawingml/2006/main" xmlns:p="http://schemas.openxmlformats.org/presentationml/2006/main" xmlns:r="http://schemas.openxmlformats.org/officeDocument/2006/relationships" xmlns:p14="http://schemas.microsoft.com/office/powerpoint/2010/main" xmlns:p15="http://schemas.microsoft.com/office/powerpoint/2012/main" xmlns:mc="http://schemas.openxmlformats.org/markup-compatibility/2006" type="fourObj" preserve="1">
+  <p:cSld name="Title, 4 Content">
+    <p:spTree>
+      <p:nvGrpSpPr>
+        <p:cNvPr id="1" name=""/>
+        <p:cNvGrpSpPr/>
+        <p:nvPr/>
+      </p:nvGrpSpPr>
+      <p:grpSpPr>
+        <a:xfrm>
+          <a:off x="0" y="0"/>
+          <a:ext cx="0" cy="0"/>
+          <a:chOff x="0" y="0"/>
+          <a:chExt cx="0" cy="0"/>
+        </a:xfrm>
+      </p:grpSpPr>
+      <p:sp>
+        <p:nvSpPr>
+          <p:cNvPr id="64" name="PlaceHolder 1"/>
+          <p:cNvSpPr>
+            <a:spLocks noGrp="1"/>
+          </p:cNvSpPr>
+          <p:nvPr>
+            <p:ph type="title"/>
+          </p:nvPr>
+        </p:nvSpPr>
+        <p:spPr>
+          <a:xfrm>
+            <a:off x="504000" y="226080"/>
+            <a:ext cx="9071280" cy="946080"/>
+          </a:xfrm>
+          <a:prstGeom prst="rect">
+            <a:avLst/>
+          </a:prstGeom>
+        </p:spPr>
+        <p:txBody>
+          <a:bodyPr lIns="0" rIns="0" tIns="0" bIns="0" anchor="ctr">
+            <a:noAutofit/>
+          </a:bodyPr>
+          <a:p>
+            <a:pPr algn="ctr"/>
+            <a:endParaRPr b="0" lang="en-US" sz="4400" spc="-1" strike="noStrike">
+              <a:latin typeface="Arial"/>
+            </a:endParaRPr>
+          </a:p>
+        </p:txBody>
+      </p:sp>
+      <p:sp>
+        <p:nvSpPr>
+          <p:cNvPr id="65" name="PlaceHolder 2"/>
+          <p:cNvSpPr>
+            <a:spLocks noGrp="1"/>
+          </p:cNvSpPr>
+          <p:nvPr>
+            <p:ph type="body"/>
+          </p:nvPr>
+        </p:nvSpPr>
+        <p:spPr>
+          <a:xfrm>
+            <a:off x="504000" y="1326600"/>
+            <a:ext cx="4426560" cy="1568160"/>
+          </a:xfrm>
+          <a:prstGeom prst="rect">
+            <a:avLst/>
+          </a:prstGeom>
+        </p:spPr>
+        <p:txBody>
+          <a:bodyPr lIns="0" rIns="0" tIns="0" bIns="0">
+            <a:normAutofit/>
+          </a:bodyPr>
+          <a:p>
+            <a:endParaRPr b="0" lang="en-US" sz="3200" spc="-1" strike="noStrike">
+              <a:latin typeface="Arial"/>
+            </a:endParaRPr>
+          </a:p>
+        </p:txBody>
+      </p:sp>
+      <p:sp>
+        <p:nvSpPr>
+          <p:cNvPr id="66" name="PlaceHolder 3"/>
+          <p:cNvSpPr>
+            <a:spLocks noGrp="1"/>
+          </p:cNvSpPr>
+          <p:nvPr>
+            <p:ph type="body"/>
+          </p:nvPr>
+        </p:nvSpPr>
+        <p:spPr>
+          <a:xfrm>
+            <a:off x="5152320" y="1326600"/>
+            <a:ext cx="4426560" cy="1568160"/>
+          </a:xfrm>
+          <a:prstGeom prst="rect">
+            <a:avLst/>
+          </a:prstGeom>
+        </p:spPr>
+        <p:txBody>
+          <a:bodyPr lIns="0" rIns="0" tIns="0" bIns="0">
+            <a:normAutofit/>
+          </a:bodyPr>
+          <a:p>
+            <a:endParaRPr b="0" lang="en-US" sz="3200" spc="-1" strike="noStrike">
+              <a:latin typeface="Arial"/>
+            </a:endParaRPr>
+          </a:p>
+        </p:txBody>
+      </p:sp>
+      <p:sp>
+        <p:nvSpPr>
+          <p:cNvPr id="67" name="PlaceHolder 4"/>
+          <p:cNvSpPr>
+            <a:spLocks noGrp="1"/>
+          </p:cNvSpPr>
+          <p:nvPr>
+            <p:ph type="body"/>
+          </p:nvPr>
+        </p:nvSpPr>
+        <p:spPr>
+          <a:xfrm>
+            <a:off x="504000" y="3044160"/>
+            <a:ext cx="4426560" cy="1568160"/>
+          </a:xfrm>
+          <a:prstGeom prst="rect">
+            <a:avLst/>
+          </a:prstGeom>
+        </p:spPr>
+        <p:txBody>
+          <a:bodyPr lIns="0" rIns="0" tIns="0" bIns="0">
+            <a:normAutofit/>
+          </a:bodyPr>
+          <a:p>
+            <a:endParaRPr b="0" lang="en-US" sz="3200" spc="-1" strike="noStrike">
+              <a:latin typeface="Arial"/>
+            </a:endParaRPr>
+          </a:p>
+        </p:txBody>
+      </p:sp>
+      <p:sp>
+        <p:nvSpPr>
+          <p:cNvPr id="68" name="PlaceHolder 5"/>
+          <p:cNvSpPr>
+            <a:spLocks noGrp="1"/>
+          </p:cNvSpPr>
+          <p:nvPr>
+            <p:ph type="body"/>
+          </p:nvPr>
+        </p:nvSpPr>
+        <p:spPr>
+          <a:xfrm>
+            <a:off x="5152320" y="3044160"/>
+            <a:ext cx="4426560" cy="1568160"/>
+          </a:xfrm>
+          <a:prstGeom prst="rect">
+            <a:avLst/>
+          </a:prstGeom>
+        </p:spPr>
+        <p:txBody>
+          <a:bodyPr lIns="0" rIns="0" tIns="0" bIns="0">
+            <a:normAutofit/>
+          </a:bodyPr>
+          <a:p>
+            <a:endParaRPr b="0" lang="en-US" sz="3200" spc="-1" strike="noStrike">
+              <a:latin typeface="Arial"/>
+            </a:endParaRPr>
+          </a:p>
+        </p:txBody>
+      </p:sp>
+    </p:spTree>
+  </p:cSld>
+</p:sldLayout>
+</file>
+
+<file path=ppt/slideLayouts/slideLayout24.xml><?xml version="1.0" encoding="utf-8"?>
+<p:sldLayout xmlns:a="http://schemas.openxmlformats.org/drawingml/2006/main" xmlns:p="http://schemas.openxmlformats.org/presentationml/2006/main" xmlns:r="http://schemas.openxmlformats.org/officeDocument/2006/relationships" xmlns:p14="http://schemas.microsoft.com/office/powerpoint/2010/main" xmlns:p15="http://schemas.microsoft.com/office/powerpoint/2012/main" xmlns:mc="http://schemas.openxmlformats.org/markup-compatibility/2006" type="blank" preserve="1">
+  <p:cSld name="Title, 6 Content">
+    <p:spTree>
+      <p:nvGrpSpPr>
+        <p:cNvPr id="1" name=""/>
+        <p:cNvGrpSpPr/>
+        <p:nvPr/>
+      </p:nvGrpSpPr>
+      <p:grpSpPr>
+        <a:xfrm>
+          <a:off x="0" y="0"/>
+          <a:ext cx="0" cy="0"/>
+          <a:chOff x="0" y="0"/>
+          <a:chExt cx="0" cy="0"/>
+        </a:xfrm>
+      </p:grpSpPr>
+      <p:sp>
+        <p:nvSpPr>
+          <p:cNvPr id="69" name="PlaceHolder 1"/>
+          <p:cNvSpPr>
+            <a:spLocks noGrp="1"/>
+          </p:cNvSpPr>
+          <p:nvPr>
+            <p:ph type="title"/>
+          </p:nvPr>
+        </p:nvSpPr>
+        <p:spPr>
+          <a:xfrm>
+            <a:off x="504000" y="226080"/>
+            <a:ext cx="9071280" cy="946080"/>
+          </a:xfrm>
+          <a:prstGeom prst="rect">
+            <a:avLst/>
+          </a:prstGeom>
+        </p:spPr>
+        <p:txBody>
+          <a:bodyPr lIns="0" rIns="0" tIns="0" bIns="0" anchor="ctr">
+            <a:noAutofit/>
+          </a:bodyPr>
+          <a:p>
+            <a:pPr algn="ctr"/>
+            <a:endParaRPr b="0" lang="en-US" sz="4400" spc="-1" strike="noStrike">
+              <a:latin typeface="Arial"/>
+            </a:endParaRPr>
+          </a:p>
+        </p:txBody>
+      </p:sp>
+      <p:sp>
+        <p:nvSpPr>
+          <p:cNvPr id="70" name="PlaceHolder 2"/>
+          <p:cNvSpPr>
+            <a:spLocks noGrp="1"/>
+          </p:cNvSpPr>
+          <p:nvPr>
+            <p:ph type="body"/>
+          </p:nvPr>
+        </p:nvSpPr>
+        <p:spPr>
+          <a:xfrm>
+            <a:off x="504000" y="1326600"/>
+            <a:ext cx="2920680" cy="1568160"/>
+          </a:xfrm>
+          <a:prstGeom prst="rect">
+            <a:avLst/>
+          </a:prstGeom>
+        </p:spPr>
+        <p:txBody>
+          <a:bodyPr lIns="0" rIns="0" tIns="0" bIns="0">
+            <a:normAutofit/>
+          </a:bodyPr>
+          <a:p>
+            <a:endParaRPr b="0" lang="en-US" sz="3200" spc="-1" strike="noStrike">
+              <a:latin typeface="Arial"/>
+            </a:endParaRPr>
+          </a:p>
+        </p:txBody>
+      </p:sp>
+      <p:sp>
+        <p:nvSpPr>
+          <p:cNvPr id="71" name="PlaceHolder 3"/>
+          <p:cNvSpPr>
+            <a:spLocks noGrp="1"/>
+          </p:cNvSpPr>
+          <p:nvPr>
+            <p:ph type="body"/>
+          </p:nvPr>
+        </p:nvSpPr>
+        <p:spPr>
+          <a:xfrm>
+            <a:off x="3571200" y="1326600"/>
+            <a:ext cx="2920680" cy="1568160"/>
+          </a:xfrm>
+          <a:prstGeom prst="rect">
+            <a:avLst/>
+          </a:prstGeom>
+        </p:spPr>
+        <p:txBody>
+          <a:bodyPr lIns="0" rIns="0" tIns="0" bIns="0">
+            <a:normAutofit/>
+          </a:bodyPr>
+          <a:p>
+            <a:endParaRPr b="0" lang="en-US" sz="3200" spc="-1" strike="noStrike">
+              <a:latin typeface="Arial"/>
+            </a:endParaRPr>
+          </a:p>
+        </p:txBody>
+      </p:sp>
+      <p:sp>
+        <p:nvSpPr>
+          <p:cNvPr id="72" name="PlaceHolder 4"/>
+          <p:cNvSpPr>
+            <a:spLocks noGrp="1"/>
+          </p:cNvSpPr>
+          <p:nvPr>
+            <p:ph type="body"/>
+          </p:nvPr>
+        </p:nvSpPr>
+        <p:spPr>
+          <a:xfrm>
+            <a:off x="6638040" y="1326600"/>
+            <a:ext cx="2920680" cy="1568160"/>
+          </a:xfrm>
+          <a:prstGeom prst="rect">
+            <a:avLst/>
+          </a:prstGeom>
+        </p:spPr>
+        <p:txBody>
+          <a:bodyPr lIns="0" rIns="0" tIns="0" bIns="0">
+            <a:normAutofit/>
+          </a:bodyPr>
+          <a:p>
+            <a:endParaRPr b="0" lang="en-US" sz="3200" spc="-1" strike="noStrike">
+              <a:latin typeface="Arial"/>
+            </a:endParaRPr>
+          </a:p>
+        </p:txBody>
+      </p:sp>
+      <p:sp>
+        <p:nvSpPr>
+          <p:cNvPr id="73" name="PlaceHolder 5"/>
+          <p:cNvSpPr>
+            <a:spLocks noGrp="1"/>
+          </p:cNvSpPr>
+          <p:nvPr>
+            <p:ph type="body"/>
+          </p:nvPr>
+        </p:nvSpPr>
+        <p:spPr>
+          <a:xfrm>
+            <a:off x="504000" y="3044160"/>
+            <a:ext cx="2920680" cy="1568160"/>
+          </a:xfrm>
+          <a:prstGeom prst="rect">
+            <a:avLst/>
+          </a:prstGeom>
+        </p:spPr>
+        <p:txBody>
+          <a:bodyPr lIns="0" rIns="0" tIns="0" bIns="0">
+            <a:normAutofit/>
+          </a:bodyPr>
+          <a:p>
+            <a:endParaRPr b="0" lang="en-US" sz="3200" spc="-1" strike="noStrike">
+              <a:latin typeface="Arial"/>
+            </a:endParaRPr>
+          </a:p>
+        </p:txBody>
+      </p:sp>
+      <p:sp>
+        <p:nvSpPr>
+          <p:cNvPr id="74" name="PlaceHolder 6"/>
+          <p:cNvSpPr>
+            <a:spLocks noGrp="1"/>
+          </p:cNvSpPr>
+          <p:nvPr>
+            <p:ph type="body"/>
+          </p:nvPr>
+        </p:nvSpPr>
+        <p:spPr>
+          <a:xfrm>
+            <a:off x="3571200" y="3044160"/>
+            <a:ext cx="2920680" cy="1568160"/>
+          </a:xfrm>
+          <a:prstGeom prst="rect">
+            <a:avLst/>
+          </a:prstGeom>
+        </p:spPr>
+        <p:txBody>
+          <a:bodyPr lIns="0" rIns="0" tIns="0" bIns="0">
+            <a:normAutofit/>
+          </a:bodyPr>
+          <a:p>
+            <a:endParaRPr b="0" lang="en-US" sz="3200" spc="-1" strike="noStrike">
+              <a:latin typeface="Arial"/>
+            </a:endParaRPr>
+          </a:p>
+        </p:txBody>
+      </p:sp>
+      <p:sp>
+        <p:nvSpPr>
+          <p:cNvPr id="75" name="PlaceHolder 7"/>
+          <p:cNvSpPr>
+            <a:spLocks noGrp="1"/>
+          </p:cNvSpPr>
+          <p:nvPr>
+            <p:ph type="body"/>
+          </p:nvPr>
+        </p:nvSpPr>
+        <p:spPr>
+          <a:xfrm>
+            <a:off x="6638040" y="3044160"/>
+            <a:ext cx="2920680" cy="1568160"/>
+          </a:xfrm>
+          <a:prstGeom prst="rect">
+            <a:avLst/>
+          </a:prstGeom>
+        </p:spPr>
+        <p:txBody>
+          <a:bodyPr lIns="0" rIns="0" tIns="0" bIns="0">
+            <a:normAutofit/>
+          </a:bodyPr>
+          <a:p>
             <a:endParaRPr b="0" lang="en-US" sz="3200" spc="-1" strike="noStrike">
               <a:latin typeface="Arial"/>
             </a:endParaRPr>
@@ -658,7 +2026,7 @@
       </p:grpSpPr>
       <p:sp>
         <p:nvSpPr>
-          <p:cNvPr id="7" name="PlaceHolder 1"/>
+          <p:cNvPr id="4" name="PlaceHolder 1"/>
           <p:cNvSpPr>
             <a:spLocks noGrp="1"/>
           </p:cNvSpPr>
@@ -669,7 +2037,7 @@
         <p:spPr>
           <a:xfrm>
             <a:off x="504000" y="226080"/>
-            <a:ext cx="9071640" cy="946440"/>
+            <a:ext cx="9071280" cy="946080"/>
           </a:xfrm>
           <a:prstGeom prst="rect">
             <a:avLst/>
@@ -689,7 +2057,7 @@
       </p:sp>
       <p:sp>
         <p:nvSpPr>
-          <p:cNvPr id="8" name="PlaceHolder 2"/>
+          <p:cNvPr id="5" name="PlaceHolder 2"/>
           <p:cNvSpPr>
             <a:spLocks noGrp="1"/>
           </p:cNvSpPr>
@@ -700,7 +2068,7 @@
         <p:spPr>
           <a:xfrm>
             <a:off x="504000" y="1326600"/>
-            <a:ext cx="9071640" cy="3288240"/>
+            <a:ext cx="9071280" cy="3287880"/>
           </a:xfrm>
           <a:prstGeom prst="rect">
             <a:avLst/>
@@ -741,7 +2109,7 @@
       </p:grpSpPr>
       <p:sp>
         <p:nvSpPr>
-          <p:cNvPr id="9" name="PlaceHolder 1"/>
+          <p:cNvPr id="6" name="PlaceHolder 1"/>
           <p:cNvSpPr>
             <a:spLocks noGrp="1"/>
           </p:cNvSpPr>
@@ -752,7 +2120,7 @@
         <p:spPr>
           <a:xfrm>
             <a:off x="504000" y="226080"/>
-            <a:ext cx="9071640" cy="946440"/>
+            <a:ext cx="9071280" cy="946080"/>
           </a:xfrm>
           <a:prstGeom prst="rect">
             <a:avLst/>
@@ -772,7 +2140,7 @@
       </p:sp>
       <p:sp>
         <p:nvSpPr>
-          <p:cNvPr id="10" name="PlaceHolder 2"/>
+          <p:cNvPr id="7" name="PlaceHolder 2"/>
           <p:cNvSpPr>
             <a:spLocks noGrp="1"/>
           </p:cNvSpPr>
@@ -783,7 +2151,7 @@
         <p:spPr>
           <a:xfrm>
             <a:off x="504000" y="1326600"/>
-            <a:ext cx="4426920" cy="3288240"/>
+            <a:ext cx="4426560" cy="3287880"/>
           </a:xfrm>
           <a:prstGeom prst="rect">
             <a:avLst/>
@@ -802,7 +2170,7 @@
       </p:sp>
       <p:sp>
         <p:nvSpPr>
-          <p:cNvPr id="11" name="PlaceHolder 3"/>
+          <p:cNvPr id="8" name="PlaceHolder 3"/>
           <p:cNvSpPr>
             <a:spLocks noGrp="1"/>
           </p:cNvSpPr>
@@ -812,8 +2180,8 @@
         </p:nvSpPr>
         <p:spPr>
           <a:xfrm>
-            <a:off x="5152680" y="1326600"/>
-            <a:ext cx="4426920" cy="3288240"/>
+            <a:off x="5152320" y="1326600"/>
+            <a:ext cx="4426560" cy="3287880"/>
           </a:xfrm>
           <a:prstGeom prst="rect">
             <a:avLst/>
@@ -854,7 +2222,7 @@
       </p:grpSpPr>
       <p:sp>
         <p:nvSpPr>
-          <p:cNvPr id="12" name="PlaceHolder 1"/>
+          <p:cNvPr id="9" name="PlaceHolder 1"/>
           <p:cNvSpPr>
             <a:spLocks noGrp="1"/>
           </p:cNvSpPr>
@@ -865,7 +2233,7 @@
         <p:spPr>
           <a:xfrm>
             <a:off x="504000" y="226080"/>
-            <a:ext cx="9071640" cy="946440"/>
+            <a:ext cx="9071280" cy="946080"/>
           </a:xfrm>
           <a:prstGeom prst="rect">
             <a:avLst/>
@@ -907,7 +2275,7 @@
       </p:grpSpPr>
       <p:sp>
         <p:nvSpPr>
-          <p:cNvPr id="13" name="PlaceHolder 1"/>
+          <p:cNvPr id="10" name="PlaceHolder 1"/>
           <p:cNvSpPr>
             <a:spLocks noGrp="1"/>
           </p:cNvSpPr>
@@ -918,7 +2286,7 @@
         <p:spPr>
           <a:xfrm>
             <a:off x="504000" y="226080"/>
-            <a:ext cx="9071640" cy="4388400"/>
+            <a:ext cx="9071280" cy="4386600"/>
           </a:xfrm>
           <a:prstGeom prst="rect">
             <a:avLst/>
@@ -960,7 +2328,7 @@
       </p:grpSpPr>
       <p:sp>
         <p:nvSpPr>
-          <p:cNvPr id="14" name="PlaceHolder 1"/>
+          <p:cNvPr id="11" name="PlaceHolder 1"/>
           <p:cNvSpPr>
             <a:spLocks noGrp="1"/>
           </p:cNvSpPr>
@@ -971,7 +2339,7 @@
         <p:spPr>
           <a:xfrm>
             <a:off x="504000" y="226080"/>
-            <a:ext cx="9071640" cy="946440"/>
+            <a:ext cx="9071280" cy="946080"/>
           </a:xfrm>
           <a:prstGeom prst="rect">
             <a:avLst/>
@@ -991,7 +2359,7 @@
       </p:sp>
       <p:sp>
         <p:nvSpPr>
-          <p:cNvPr id="15" name="PlaceHolder 2"/>
+          <p:cNvPr id="12" name="PlaceHolder 2"/>
           <p:cNvSpPr>
             <a:spLocks noGrp="1"/>
           </p:cNvSpPr>
@@ -1002,7 +2370,7 @@
         <p:spPr>
           <a:xfrm>
             <a:off x="504000" y="1326600"/>
-            <a:ext cx="4426920" cy="1568160"/>
+            <a:ext cx="4426560" cy="1568160"/>
           </a:xfrm>
           <a:prstGeom prst="rect">
             <a:avLst/>
@@ -1021,7 +2389,7 @@
       </p:sp>
       <p:sp>
         <p:nvSpPr>
-          <p:cNvPr id="16" name="PlaceHolder 3"/>
+          <p:cNvPr id="13" name="PlaceHolder 3"/>
           <p:cNvSpPr>
             <a:spLocks noGrp="1"/>
           </p:cNvSpPr>
@@ -1031,8 +2399,8 @@
         </p:nvSpPr>
         <p:spPr>
           <a:xfrm>
-            <a:off x="5152680" y="1326600"/>
-            <a:ext cx="4426920" cy="3288240"/>
+            <a:off x="5152320" y="1326600"/>
+            <a:ext cx="4426560" cy="3287880"/>
           </a:xfrm>
           <a:prstGeom prst="rect">
             <a:avLst/>
@@ -1051,7 +2419,7 @@
       </p:sp>
       <p:sp>
         <p:nvSpPr>
-          <p:cNvPr id="17" name="PlaceHolder 4"/>
+          <p:cNvPr id="14" name="PlaceHolder 4"/>
           <p:cNvSpPr>
             <a:spLocks noGrp="1"/>
           </p:cNvSpPr>
@@ -1062,7 +2430,7 @@
         <p:spPr>
           <a:xfrm>
             <a:off x="504000" y="3044160"/>
-            <a:ext cx="4426920" cy="1568160"/>
+            <a:ext cx="4426560" cy="1568160"/>
           </a:xfrm>
           <a:prstGeom prst="rect">
             <a:avLst/>
@@ -1103,7 +2471,7 @@
       </p:grpSpPr>
       <p:sp>
         <p:nvSpPr>
-          <p:cNvPr id="18" name="PlaceHolder 1"/>
+          <p:cNvPr id="15" name="PlaceHolder 1"/>
           <p:cNvSpPr>
             <a:spLocks noGrp="1"/>
           </p:cNvSpPr>
@@ -1114,7 +2482,7 @@
         <p:spPr>
           <a:xfrm>
             <a:off x="504000" y="226080"/>
-            <a:ext cx="9071640" cy="946440"/>
+            <a:ext cx="9071280" cy="946080"/>
           </a:xfrm>
           <a:prstGeom prst="rect">
             <a:avLst/>
@@ -1134,7 +2502,7 @@
       </p:sp>
       <p:sp>
         <p:nvSpPr>
-          <p:cNvPr id="19" name="PlaceHolder 2"/>
+          <p:cNvPr id="16" name="PlaceHolder 2"/>
           <p:cNvSpPr>
             <a:spLocks noGrp="1"/>
           </p:cNvSpPr>
@@ -1145,7 +2513,7 @@
         <p:spPr>
           <a:xfrm>
             <a:off x="504000" y="1326600"/>
-            <a:ext cx="4426920" cy="3288240"/>
+            <a:ext cx="4426560" cy="3287880"/>
           </a:xfrm>
           <a:prstGeom prst="rect">
             <a:avLst/>
@@ -1164,7 +2532,7 @@
       </p:sp>
       <p:sp>
         <p:nvSpPr>
-          <p:cNvPr id="20" name="PlaceHolder 3"/>
+          <p:cNvPr id="17" name="PlaceHolder 3"/>
           <p:cNvSpPr>
             <a:spLocks noGrp="1"/>
           </p:cNvSpPr>
@@ -1174,8 +2542,8 @@
         </p:nvSpPr>
         <p:spPr>
           <a:xfrm>
-            <a:off x="5152680" y="1326600"/>
-            <a:ext cx="4426920" cy="1568160"/>
+            <a:off x="5152320" y="1326600"/>
+            <a:ext cx="4426560" cy="1568160"/>
           </a:xfrm>
           <a:prstGeom prst="rect">
             <a:avLst/>
@@ -1194,7 +2562,7 @@
       </p:sp>
       <p:sp>
         <p:nvSpPr>
-          <p:cNvPr id="21" name="PlaceHolder 4"/>
+          <p:cNvPr id="18" name="PlaceHolder 4"/>
           <p:cNvSpPr>
             <a:spLocks noGrp="1"/>
           </p:cNvSpPr>
@@ -1204,8 +2572,8 @@
         </p:nvSpPr>
         <p:spPr>
           <a:xfrm>
-            <a:off x="5152680" y="3044160"/>
-            <a:ext cx="4426920" cy="1568160"/>
+            <a:off x="5152320" y="3044160"/>
+            <a:ext cx="4426560" cy="1568160"/>
           </a:xfrm>
           <a:prstGeom prst="rect">
             <a:avLst/>
@@ -1246,7 +2614,7 @@
       </p:grpSpPr>
       <p:sp>
         <p:nvSpPr>
-          <p:cNvPr id="22" name="PlaceHolder 1"/>
+          <p:cNvPr id="19" name="PlaceHolder 1"/>
           <p:cNvSpPr>
             <a:spLocks noGrp="1"/>
           </p:cNvSpPr>
@@ -1257,7 +2625,7 @@
         <p:spPr>
           <a:xfrm>
             <a:off x="504000" y="226080"/>
-            <a:ext cx="9071640" cy="946440"/>
+            <a:ext cx="9071280" cy="946080"/>
           </a:xfrm>
           <a:prstGeom prst="rect">
             <a:avLst/>
@@ -1277,7 +2645,7 @@
       </p:sp>
       <p:sp>
         <p:nvSpPr>
-          <p:cNvPr id="23" name="PlaceHolder 2"/>
+          <p:cNvPr id="20" name="PlaceHolder 2"/>
           <p:cNvSpPr>
             <a:spLocks noGrp="1"/>
           </p:cNvSpPr>
@@ -1288,7 +2656,7 @@
         <p:spPr>
           <a:xfrm>
             <a:off x="504000" y="1326600"/>
-            <a:ext cx="4426920" cy="1568160"/>
+            <a:ext cx="4426560" cy="1568160"/>
           </a:xfrm>
           <a:prstGeom prst="rect">
             <a:avLst/>
@@ -1307,7 +2675,7 @@
       </p:sp>
       <p:sp>
         <p:nvSpPr>
-          <p:cNvPr id="24" name="PlaceHolder 3"/>
+          <p:cNvPr id="21" name="PlaceHolder 3"/>
           <p:cNvSpPr>
             <a:spLocks noGrp="1"/>
           </p:cNvSpPr>
@@ -1317,8 +2685,8 @@
         </p:nvSpPr>
         <p:spPr>
           <a:xfrm>
-            <a:off x="5152680" y="1326600"/>
-            <a:ext cx="4426920" cy="1568160"/>
+            <a:off x="5152320" y="1326600"/>
+            <a:ext cx="4426560" cy="1568160"/>
           </a:xfrm>
           <a:prstGeom prst="rect">
             <a:avLst/>
@@ -1337,7 +2705,7 @@
       </p:sp>
       <p:sp>
         <p:nvSpPr>
-          <p:cNvPr id="25" name="PlaceHolder 4"/>
+          <p:cNvPr id="22" name="PlaceHolder 4"/>
           <p:cNvSpPr>
             <a:spLocks noGrp="1"/>
           </p:cNvSpPr>
@@ -1348,7 +2716,7 @@
         <p:spPr>
           <a:xfrm>
             <a:off x="504000" y="3044160"/>
-            <a:ext cx="9071640" cy="1568160"/>
+            <a:ext cx="9071280" cy="1568160"/>
           </a:xfrm>
           <a:prstGeom prst="rect">
             <a:avLst/>
@@ -1400,7 +2768,7 @@
         <p:spPr>
           <a:xfrm>
             <a:off x="504000" y="226080"/>
-            <a:ext cx="9071640" cy="946440"/>
+            <a:ext cx="9071280" cy="946080"/>
           </a:xfrm>
           <a:prstGeom prst="rect">
             <a:avLst/>
@@ -1413,12 +2781,12 @@
           <a:p>
             <a:pPr algn="ctr"/>
             <a:r>
-              <a:rPr b="0" lang="en-US" sz="4400" spc="-1" strike="noStrike">
+              <a:rPr b="0" lang="en-US" sz="1800" spc="-1" strike="noStrike">
                 <a:latin typeface="Arial"/>
               </a:rPr>
               <a:t>Click to edit the title text format</a:t>
             </a:r>
-            <a:endParaRPr b="0" lang="en-US" sz="4400" spc="-1" strike="noStrike">
+            <a:endParaRPr b="0" lang="en-US" sz="1800" spc="-1" strike="noStrike">
               <a:latin typeface="Arial"/>
             </a:endParaRPr>
           </a:p>
@@ -1437,7 +2805,7 @@
         <p:spPr>
           <a:xfrm>
             <a:off x="504000" y="1326600"/>
-            <a:ext cx="9071640" cy="3288240"/>
+            <a:ext cx="9072000" cy="3288600"/>
           </a:xfrm>
           <a:prstGeom prst="rect">
             <a:avLst/>
@@ -1599,116 +2967,6 @@
             </a:r>
             <a:endParaRPr b="0" lang="en-US" sz="2000" spc="-1" strike="noStrike">
               <a:latin typeface="Arial"/>
-            </a:endParaRPr>
-          </a:p>
-        </p:txBody>
-      </p:sp>
-      <p:sp>
-        <p:nvSpPr>
-          <p:cNvPr id="2" name="PlaceHolder 3"/>
-          <p:cNvSpPr>
-            <a:spLocks noGrp="1"/>
-          </p:cNvSpPr>
-          <p:nvPr>
-            <p:ph type="dt"/>
-          </p:nvPr>
-        </p:nvSpPr>
-        <p:spPr>
-          <a:xfrm>
-            <a:off x="504000" y="5165280"/>
-            <a:ext cx="2348280" cy="390600"/>
-          </a:xfrm>
-          <a:prstGeom prst="rect">
-            <a:avLst/>
-          </a:prstGeom>
-        </p:spPr>
-        <p:txBody>
-          <a:bodyPr lIns="0" rIns="0" tIns="0" bIns="0">
-            <a:noAutofit/>
-          </a:bodyPr>
-          <a:p>
-            <a:r>
-              <a:rPr b="0" lang="en-US" sz="1400" spc="-1" strike="noStrike">
-                <a:latin typeface="Times New Roman"/>
-              </a:rPr>
-              <a:t>&lt;date/time&gt;</a:t>
-            </a:r>
-            <a:endParaRPr b="0" lang="en-US" sz="1400" spc="-1" strike="noStrike">
-              <a:latin typeface="Times New Roman"/>
-            </a:endParaRPr>
-          </a:p>
-        </p:txBody>
-      </p:sp>
-      <p:sp>
-        <p:nvSpPr>
-          <p:cNvPr id="3" name="PlaceHolder 4"/>
-          <p:cNvSpPr>
-            <a:spLocks noGrp="1"/>
-          </p:cNvSpPr>
-          <p:nvPr>
-            <p:ph type="ftr"/>
-          </p:nvPr>
-        </p:nvSpPr>
-        <p:spPr>
-          <a:xfrm>
-            <a:off x="3447360" y="5165280"/>
-            <a:ext cx="3195000" cy="390600"/>
-          </a:xfrm>
-          <a:prstGeom prst="rect">
-            <a:avLst/>
-          </a:prstGeom>
-        </p:spPr>
-        <p:txBody>
-          <a:bodyPr lIns="0" rIns="0" tIns="0" bIns="0">
-            <a:noAutofit/>
-          </a:bodyPr>
-          <a:p>
-            <a:pPr algn="ctr"/>
-            <a:r>
-              <a:rPr b="0" lang="en-US" sz="1400" spc="-1" strike="noStrike">
-                <a:latin typeface="Times New Roman"/>
-              </a:rPr>
-              <a:t>&lt;footer&gt;</a:t>
-            </a:r>
-            <a:endParaRPr b="0" lang="en-US" sz="1400" spc="-1" strike="noStrike">
-              <a:latin typeface="Times New Roman"/>
-            </a:endParaRPr>
-          </a:p>
-        </p:txBody>
-      </p:sp>
-      <p:sp>
-        <p:nvSpPr>
-          <p:cNvPr id="4" name="PlaceHolder 5"/>
-          <p:cNvSpPr>
-            <a:spLocks noGrp="1"/>
-          </p:cNvSpPr>
-          <p:nvPr>
-            <p:ph type="sldNum"/>
-          </p:nvPr>
-        </p:nvSpPr>
-        <p:spPr>
-          <a:xfrm>
-            <a:off x="7227360" y="5165280"/>
-            <a:ext cx="2348280" cy="390600"/>
-          </a:xfrm>
-          <a:prstGeom prst="rect">
-            <a:avLst/>
-          </a:prstGeom>
-        </p:spPr>
-        <p:txBody>
-          <a:bodyPr lIns="0" rIns="0" tIns="0" bIns="0">
-            <a:noAutofit/>
-          </a:bodyPr>
-          <a:p>
-            <a:pPr algn="r"/>
-            <a:fld id="{D6CC435E-5F3D-4C9D-8C81-7FEEDBCAF456}" type="slidenum">
-              <a:rPr b="0" lang="en-US" sz="1400" spc="-1" strike="noStrike">
-                <a:latin typeface="Times New Roman"/>
-              </a:rPr>
-              <a:t>&lt;number&gt;</a:t>
-            </a:fld>
-            <a:endParaRPr b="0" lang="en-US" sz="1400" spc="-1" strike="noStrike">
-              <a:latin typeface="Times New Roman"/>
             </a:endParaRPr>
           </a:p>
         </p:txBody>
@@ -1729,6 +2987,265 @@
     <p:sldLayoutId id="2147483658" r:id="rId11"/>
     <p:sldLayoutId id="2147483659" r:id="rId12"/>
     <p:sldLayoutId id="2147483660" r:id="rId13"/>
+  </p:sldLayoutIdLst>
+</p:sldMaster>
+</file>
+
+<file path=ppt/slideMasters/slideMaster2.xml><?xml version="1.0" encoding="utf-8"?>
+<p:sldMaster xmlns:a="http://schemas.openxmlformats.org/drawingml/2006/main" xmlns:p="http://schemas.openxmlformats.org/presentationml/2006/main" xmlns:r="http://schemas.openxmlformats.org/officeDocument/2006/relationships" xmlns:p14="http://schemas.microsoft.com/office/powerpoint/2010/main" xmlns:p15="http://schemas.microsoft.com/office/powerpoint/2012/main" xmlns:mc="http://schemas.openxmlformats.org/markup-compatibility/2006">
+  <p:cSld>
+    <p:spTree>
+      <p:nvGrpSpPr>
+        <p:cNvPr id="1" name=""/>
+        <p:cNvGrpSpPr/>
+        <p:nvPr/>
+      </p:nvGrpSpPr>
+      <p:grpSpPr>
+        <a:xfrm>
+          <a:off x="0" y="0"/>
+          <a:ext cx="0" cy="0"/>
+          <a:chOff x="0" y="0"/>
+          <a:chExt cx="0" cy="0"/>
+        </a:xfrm>
+      </p:grpSpPr>
+      <p:sp>
+        <p:nvSpPr>
+          <p:cNvPr id="38" name="PlaceHolder 1"/>
+          <p:cNvSpPr>
+            <a:spLocks noGrp="1"/>
+          </p:cNvSpPr>
+          <p:nvPr>
+            <p:ph type="title"/>
+          </p:nvPr>
+        </p:nvSpPr>
+        <p:spPr>
+          <a:xfrm>
+            <a:off x="504000" y="226080"/>
+            <a:ext cx="9071280" cy="946080"/>
+          </a:xfrm>
+          <a:prstGeom prst="rect">
+            <a:avLst/>
+          </a:prstGeom>
+        </p:spPr>
+        <p:txBody>
+          <a:bodyPr lIns="0" rIns="0" tIns="0" bIns="0" anchor="ctr">
+            <a:noAutofit/>
+          </a:bodyPr>
+          <a:p>
+            <a:pPr algn="ctr"/>
+            <a:r>
+              <a:rPr b="0" lang="en-US" sz="1800" spc="-1" strike="noStrike">
+                <a:latin typeface="Arial"/>
+              </a:rPr>
+              <a:t>Click to edit the title text format</a:t>
+            </a:r>
+            <a:endParaRPr b="0" lang="en-US" sz="1800" spc="-1" strike="noStrike">
+              <a:latin typeface="Arial"/>
+            </a:endParaRPr>
+          </a:p>
+        </p:txBody>
+      </p:sp>
+      <p:sp>
+        <p:nvSpPr>
+          <p:cNvPr id="39" name="PlaceHolder 2"/>
+          <p:cNvSpPr>
+            <a:spLocks noGrp="1"/>
+          </p:cNvSpPr>
+          <p:nvPr>
+            <p:ph type="body"/>
+          </p:nvPr>
+        </p:nvSpPr>
+        <p:spPr>
+          <a:xfrm>
+            <a:off x="504000" y="1326600"/>
+            <a:ext cx="9071280" cy="3287880"/>
+          </a:xfrm>
+          <a:prstGeom prst="rect">
+            <a:avLst/>
+          </a:prstGeom>
+        </p:spPr>
+        <p:txBody>
+          <a:bodyPr lIns="0" rIns="0" tIns="0" bIns="0">
+            <a:normAutofit/>
+          </a:bodyPr>
+          <a:p>
+            <a:pPr marL="432000" indent="-324000" algn="ctr">
+              <a:spcBef>
+                <a:spcPts val="1417"/>
+              </a:spcBef>
+              <a:buClr>
+                <a:srgbClr val="000000"/>
+              </a:buClr>
+              <a:buSzPct val="45000"/>
+              <a:buFont typeface="Wingdings" charset="2"/>
+              <a:buChar char=""/>
+            </a:pPr>
+            <a:r>
+              <a:rPr b="0" lang="en-US" sz="1800" spc="-1" strike="noStrike">
+                <a:latin typeface="Arial"/>
+              </a:rPr>
+              <a:t>Click to edit the outline text format</a:t>
+            </a:r>
+            <a:endParaRPr b="0" lang="en-US" sz="1800" spc="-1" strike="noStrike">
+              <a:latin typeface="Arial"/>
+            </a:endParaRPr>
+          </a:p>
+          <a:p>
+            <a:pPr lvl="1" marL="864000" indent="-324000" algn="ctr">
+              <a:spcBef>
+                <a:spcPts val="1134"/>
+              </a:spcBef>
+              <a:buClr>
+                <a:srgbClr val="000000"/>
+              </a:buClr>
+              <a:buSzPct val="75000"/>
+              <a:buFont typeface="Symbol" charset="2"/>
+              <a:buChar char=""/>
+            </a:pPr>
+            <a:r>
+              <a:rPr b="0" lang="en-US" sz="1800" spc="-1" strike="noStrike">
+                <a:latin typeface="Arial"/>
+              </a:rPr>
+              <a:t>Second Outline Level</a:t>
+            </a:r>
+            <a:endParaRPr b="0" lang="en-US" sz="1800" spc="-1" strike="noStrike">
+              <a:latin typeface="Arial"/>
+            </a:endParaRPr>
+          </a:p>
+          <a:p>
+            <a:pPr lvl="2" marL="1296000" indent="-288000" algn="ctr">
+              <a:spcBef>
+                <a:spcPts val="850"/>
+              </a:spcBef>
+              <a:buClr>
+                <a:srgbClr val="000000"/>
+              </a:buClr>
+              <a:buSzPct val="45000"/>
+              <a:buFont typeface="Wingdings" charset="2"/>
+              <a:buChar char=""/>
+            </a:pPr>
+            <a:r>
+              <a:rPr b="0" lang="en-US" sz="1800" spc="-1" strike="noStrike">
+                <a:latin typeface="Arial"/>
+              </a:rPr>
+              <a:t>Third Outline Level</a:t>
+            </a:r>
+            <a:endParaRPr b="0" lang="en-US" sz="1800" spc="-1" strike="noStrike">
+              <a:latin typeface="Arial"/>
+            </a:endParaRPr>
+          </a:p>
+          <a:p>
+            <a:pPr lvl="3" marL="1728000" indent="-216000" algn="ctr">
+              <a:spcBef>
+                <a:spcPts val="567"/>
+              </a:spcBef>
+              <a:buClr>
+                <a:srgbClr val="000000"/>
+              </a:buClr>
+              <a:buSzPct val="75000"/>
+              <a:buFont typeface="Symbol" charset="2"/>
+              <a:buChar char=""/>
+            </a:pPr>
+            <a:r>
+              <a:rPr b="0" lang="en-US" sz="1800" spc="-1" strike="noStrike">
+                <a:latin typeface="Arial"/>
+              </a:rPr>
+              <a:t>Fourth Outline Level</a:t>
+            </a:r>
+            <a:endParaRPr b="0" lang="en-US" sz="1800" spc="-1" strike="noStrike">
+              <a:latin typeface="Arial"/>
+            </a:endParaRPr>
+          </a:p>
+          <a:p>
+            <a:pPr lvl="4" marL="2160000" indent="-216000" algn="ctr">
+              <a:spcBef>
+                <a:spcPts val="283"/>
+              </a:spcBef>
+              <a:buClr>
+                <a:srgbClr val="000000"/>
+              </a:buClr>
+              <a:buSzPct val="45000"/>
+              <a:buFont typeface="Wingdings" charset="2"/>
+              <a:buChar char=""/>
+            </a:pPr>
+            <a:r>
+              <a:rPr b="0" lang="en-US" sz="1800" spc="-1" strike="noStrike">
+                <a:latin typeface="Arial"/>
+              </a:rPr>
+              <a:t>Fifth Outline Level</a:t>
+            </a:r>
+            <a:endParaRPr b="0" lang="en-US" sz="1800" spc="-1" strike="noStrike">
+              <a:latin typeface="Arial"/>
+            </a:endParaRPr>
+          </a:p>
+          <a:p>
+            <a:pPr lvl="5" marL="2592000" indent="-216000" algn="ctr">
+              <a:spcBef>
+                <a:spcPts val="283"/>
+              </a:spcBef>
+              <a:buClr>
+                <a:srgbClr val="000000"/>
+              </a:buClr>
+              <a:buSzPct val="45000"/>
+              <a:buFont typeface="Wingdings" charset="2"/>
+              <a:buChar char=""/>
+            </a:pPr>
+            <a:r>
+              <a:rPr b="0" lang="en-US" sz="1800" spc="-1" strike="noStrike">
+                <a:latin typeface="Arial"/>
+              </a:rPr>
+              <a:t>Sixth Outline Level</a:t>
+            </a:r>
+            <a:endParaRPr b="0" lang="en-US" sz="1800" spc="-1" strike="noStrike">
+              <a:latin typeface="Arial"/>
+            </a:endParaRPr>
+          </a:p>
+          <a:p>
+            <a:pPr lvl="6" marL="3024000" indent="-216000" algn="ctr">
+              <a:spcBef>
+                <a:spcPts val="283"/>
+              </a:spcBef>
+              <a:buClr>
+                <a:srgbClr val="000000"/>
+              </a:buClr>
+              <a:buSzPct val="45000"/>
+              <a:buFont typeface="Wingdings" charset="2"/>
+              <a:buChar char=""/>
+            </a:pPr>
+            <a:r>
+              <a:rPr b="0" lang="en-US" sz="1800" spc="-1" strike="noStrike">
+                <a:latin typeface="Arial"/>
+              </a:rPr>
+              <a:t>Seventh Outline </a:t>
+            </a:r>
+            <a:r>
+              <a:rPr b="0" lang="en-US" sz="1800" spc="-1" strike="noStrike">
+                <a:latin typeface="Arial"/>
+              </a:rPr>
+              <a:t>Level</a:t>
+            </a:r>
+            <a:endParaRPr b="0" lang="en-US" sz="1800" spc="-1" strike="noStrike">
+              <a:latin typeface="Arial"/>
+            </a:endParaRPr>
+          </a:p>
+        </p:txBody>
+      </p:sp>
+    </p:spTree>
+  </p:cSld>
+  <p:clrMap bg1="lt1" bg2="lt2" tx1="dk1" tx2="dk2" accent1="accent1" accent2="accent2" accent3="accent3" accent4="accent4" accent5="accent5" accent6="accent6" hlink="hlink" folHlink="folHlink"/>
+  <p:sldLayoutIdLst>
+    <p:sldLayoutId id="2147483662" r:id="rId2"/>
+    <p:sldLayoutId id="2147483663" r:id="rId3"/>
+    <p:sldLayoutId id="2147483664" r:id="rId4"/>
+    <p:sldLayoutId id="2147483665" r:id="rId5"/>
+    <p:sldLayoutId id="2147483666" r:id="rId6"/>
+    <p:sldLayoutId id="2147483667" r:id="rId7"/>
+    <p:sldLayoutId id="2147483668" r:id="rId8"/>
+    <p:sldLayoutId id="2147483669" r:id="rId9"/>
+    <p:sldLayoutId id="2147483670" r:id="rId10"/>
+    <p:sldLayoutId id="2147483671" r:id="rId11"/>
+    <p:sldLayoutId id="2147483672" r:id="rId12"/>
+    <p:sldLayoutId id="2147483673" r:id="rId13"/>
   </p:sldLayoutIdLst>
 </p:sldMaster>
 </file>
@@ -1752,14 +3269,14 @@
       </p:grpSpPr>
       <p:sp>
         <p:nvSpPr>
-          <p:cNvPr id="41" name="TextShape 1"/>
-          <p:cNvSpPr txBox="1"/>
+          <p:cNvPr id="76" name="CustomShape 1"/>
+          <p:cNvSpPr/>
           <p:nvPr/>
         </p:nvSpPr>
         <p:spPr>
           <a:xfrm>
             <a:off x="504000" y="226080"/>
-            <a:ext cx="9071640" cy="946440"/>
+            <a:ext cx="9071280" cy="946080"/>
           </a:xfrm>
           <a:prstGeom prst="rect">
             <a:avLst/>
@@ -1769,12 +3286,22 @@
             <a:noFill/>
           </a:ln>
         </p:spPr>
+        <p:style>
+          <a:lnRef idx="0"/>
+          <a:fillRef idx="0"/>
+          <a:effectRef idx="0"/>
+          <a:fontRef idx="minor"/>
+        </p:style>
         <p:txBody>
           <a:bodyPr lIns="0" rIns="0" tIns="0" bIns="0" anchor="ctr">
             <a:noAutofit/>
           </a:bodyPr>
           <a:p>
-            <a:pPr algn="ctr"/>
+            <a:pPr algn="ctr">
+              <a:lnSpc>
+                <a:spcPct val="100000"/>
+              </a:lnSpc>
+            </a:pPr>
             <a:r>
               <a:rPr b="0" lang="en-US" sz="4400" spc="-1" strike="noStrike">
                 <a:latin typeface="Arial"/>
@@ -1789,14 +3316,14 @@
       </p:sp>
       <p:sp>
         <p:nvSpPr>
-          <p:cNvPr id="42" name="TextShape 2"/>
-          <p:cNvSpPr txBox="1"/>
+          <p:cNvPr id="77" name="CustomShape 2"/>
+          <p:cNvSpPr/>
           <p:nvPr/>
         </p:nvSpPr>
         <p:spPr>
           <a:xfrm>
             <a:off x="504000" y="1326600"/>
-            <a:ext cx="9071640" cy="3288240"/>
+            <a:ext cx="9071280" cy="3287880"/>
           </a:xfrm>
           <a:prstGeom prst="rect">
             <a:avLst/>
@@ -1806,24 +3333,1106 @@
             <a:noFill/>
           </a:ln>
         </p:spPr>
+        <p:style>
+          <a:lnRef idx="0"/>
+          <a:fillRef idx="0"/>
+          <a:effectRef idx="0"/>
+          <a:fontRef idx="minor"/>
+        </p:style>
         <p:txBody>
           <a:bodyPr lIns="0" rIns="0" tIns="0" bIns="0" anchor="ctr">
             <a:noAutofit/>
           </a:bodyPr>
           <a:p>
+            <a:pPr algn="ctr">
+              <a:lnSpc>
+                <a:spcPct val="100000"/>
+              </a:lnSpc>
+            </a:pPr>
+            <a:r>
+              <a:rPr b="0" lang="en-US" sz="3200" spc="-1" strike="noStrike">
+                <a:latin typeface="Arial"/>
+              </a:rPr>
+              <a:t>Emily Risley, Timothy Kudryn, Nicholas Grogg</a:t>
+            </a:r>
+            <a:endParaRPr b="0" lang="en-US" sz="3200" spc="-1" strike="noStrike">
+              <a:latin typeface="Arial"/>
+            </a:endParaRPr>
+          </a:p>
+        </p:txBody>
+      </p:sp>
+    </p:spTree>
+  </p:cSld>
+  <mc:AlternateContent>
+    <mc:Choice Requires="p14">
+      <p:transition spd="slow" p14:dur="2000"/>
+    </mc:Choice>
+    <mc:Fallback>
+      <p:transition spd="slow"/>
+    </mc:Fallback>
+  </mc:AlternateContent>
+</p:sld>
+</file>
+
+<file path=ppt/slides/slide10.xml><?xml version="1.0" encoding="utf-8"?>
+<p:sld xmlns:a="http://schemas.openxmlformats.org/drawingml/2006/main" xmlns:p="http://schemas.openxmlformats.org/presentationml/2006/main" xmlns:r="http://schemas.openxmlformats.org/officeDocument/2006/relationships" xmlns:p14="http://schemas.microsoft.com/office/powerpoint/2010/main" xmlns:p15="http://schemas.microsoft.com/office/powerpoint/2012/main" xmlns:mc="http://schemas.openxmlformats.org/markup-compatibility/2006">
+  <p:cSld>
+    <p:spTree>
+      <p:nvGrpSpPr>
+        <p:cNvPr id="1" name=""/>
+        <p:cNvGrpSpPr/>
+        <p:nvPr/>
+      </p:nvGrpSpPr>
+      <p:grpSpPr>
+        <a:xfrm>
+          <a:off x="0" y="0"/>
+          <a:ext cx="0" cy="0"/>
+          <a:chOff x="0" y="0"/>
+          <a:chExt cx="0" cy="0"/>
+        </a:xfrm>
+      </p:grpSpPr>
+      <p:sp>
+        <p:nvSpPr>
+          <p:cNvPr id="92" name="TextShape 1"/>
+          <p:cNvSpPr txBox="1"/>
+          <p:nvPr/>
+        </p:nvSpPr>
+        <p:spPr>
+          <a:xfrm>
+            <a:off x="504000" y="226080"/>
+            <a:ext cx="9071280" cy="946080"/>
+          </a:xfrm>
+          <a:prstGeom prst="rect">
+            <a:avLst/>
+          </a:prstGeom>
+          <a:noFill/>
+          <a:ln>
+            <a:noFill/>
+          </a:ln>
+        </p:spPr>
+        <p:txBody>
+          <a:bodyPr lIns="0" rIns="0" tIns="0" bIns="0" anchor="ctr">
+            <a:noAutofit/>
+          </a:bodyPr>
+          <a:p>
             <a:pPr algn="ctr"/>
             <a:r>
+              <a:rPr b="0" lang="en-US" sz="4400" spc="-1" strike="noStrike">
+                <a:latin typeface="Arial"/>
+              </a:rPr>
+              <a:t>Plots</a:t>
+            </a:r>
+            <a:endParaRPr b="0" lang="en-US" sz="4400" spc="-1" strike="noStrike">
+              <a:latin typeface="Arial"/>
+            </a:endParaRPr>
+          </a:p>
+        </p:txBody>
+      </p:sp>
+      <p:sp>
+        <p:nvSpPr>
+          <p:cNvPr id="93" name="TextShape 2"/>
+          <p:cNvSpPr txBox="1"/>
+          <p:nvPr/>
+        </p:nvSpPr>
+        <p:spPr>
+          <a:xfrm>
+            <a:off x="504000" y="1326600"/>
+            <a:ext cx="9071280" cy="3287880"/>
+          </a:xfrm>
+          <a:prstGeom prst="rect">
+            <a:avLst/>
+          </a:prstGeom>
+          <a:noFill/>
+          <a:ln>
+            <a:noFill/>
+          </a:ln>
+        </p:spPr>
+        <p:txBody>
+          <a:bodyPr lIns="0" rIns="0" tIns="0" bIns="0">
+            <a:normAutofit/>
+          </a:bodyPr>
+          <a:p>
+            <a:endParaRPr b="0" lang="en-US" sz="3200" spc="-1" strike="noStrike">
+              <a:latin typeface="Arial"/>
+            </a:endParaRPr>
+          </a:p>
+        </p:txBody>
+      </p:sp>
+    </p:spTree>
+  </p:cSld>
+  <mc:AlternateContent>
+    <mc:Choice Requires="p14">
+      <p:transition spd="slow" p14:dur="2000"/>
+    </mc:Choice>
+    <mc:Fallback>
+      <p:transition spd="slow"/>
+    </mc:Fallback>
+  </mc:AlternateContent>
+</p:sld>
+</file>
+
+<file path=ppt/slides/slide11.xml><?xml version="1.0" encoding="utf-8"?>
+<p:sld xmlns:a="http://schemas.openxmlformats.org/drawingml/2006/main" xmlns:p="http://schemas.openxmlformats.org/presentationml/2006/main" xmlns:r="http://schemas.openxmlformats.org/officeDocument/2006/relationships" xmlns:p14="http://schemas.microsoft.com/office/powerpoint/2010/main" xmlns:p15="http://schemas.microsoft.com/office/powerpoint/2012/main" xmlns:mc="http://schemas.openxmlformats.org/markup-compatibility/2006">
+  <p:cSld>
+    <p:spTree>
+      <p:nvGrpSpPr>
+        <p:cNvPr id="1" name=""/>
+        <p:cNvGrpSpPr/>
+        <p:nvPr/>
+      </p:nvGrpSpPr>
+      <p:grpSpPr>
+        <a:xfrm>
+          <a:off x="0" y="0"/>
+          <a:ext cx="0" cy="0"/>
+          <a:chOff x="0" y="0"/>
+          <a:chExt cx="0" cy="0"/>
+        </a:xfrm>
+      </p:grpSpPr>
+      <p:sp>
+        <p:nvSpPr>
+          <p:cNvPr id="94" name="TextShape 1"/>
+          <p:cNvSpPr txBox="1"/>
+          <p:nvPr/>
+        </p:nvSpPr>
+        <p:spPr>
+          <a:xfrm>
+            <a:off x="504000" y="226080"/>
+            <a:ext cx="9071280" cy="946080"/>
+          </a:xfrm>
+          <a:prstGeom prst="rect">
+            <a:avLst/>
+          </a:prstGeom>
+          <a:noFill/>
+          <a:ln>
+            <a:noFill/>
+          </a:ln>
+        </p:spPr>
+        <p:txBody>
+          <a:bodyPr lIns="0" rIns="0" tIns="0" bIns="0" anchor="ctr">
+            <a:noAutofit/>
+          </a:bodyPr>
+          <a:p>
+            <a:pPr algn="ctr"/>
+            <a:r>
+              <a:rPr b="0" lang="en-US" sz="4400" spc="-1" strike="noStrike">
+                <a:latin typeface="Arial"/>
+              </a:rPr>
+              <a:t>Back-end overview</a:t>
+            </a:r>
+            <a:endParaRPr b="0" lang="en-US" sz="4400" spc="-1" strike="noStrike">
+              <a:latin typeface="Arial"/>
+            </a:endParaRPr>
+          </a:p>
+        </p:txBody>
+      </p:sp>
+      <p:sp>
+        <p:nvSpPr>
+          <p:cNvPr id="95" name="TextShape 2"/>
+          <p:cNvSpPr txBox="1"/>
+          <p:nvPr/>
+        </p:nvSpPr>
+        <p:spPr>
+          <a:xfrm>
+            <a:off x="504000" y="1326600"/>
+            <a:ext cx="9071280" cy="3287880"/>
+          </a:xfrm>
+          <a:prstGeom prst="rect">
+            <a:avLst/>
+          </a:prstGeom>
+          <a:noFill/>
+          <a:ln>
+            <a:noFill/>
+          </a:ln>
+        </p:spPr>
+        <p:txBody>
+          <a:bodyPr lIns="0" rIns="0" tIns="0" bIns="0">
+            <a:normAutofit/>
+          </a:bodyPr>
+          <a:p>
+            <a:pPr marL="432000" indent="-324000">
+              <a:spcBef>
+                <a:spcPts val="1417"/>
+              </a:spcBef>
+              <a:buClr>
+                <a:srgbClr val="000000"/>
+              </a:buClr>
+              <a:buSzPct val="45000"/>
+              <a:buFont typeface="Wingdings" charset="2"/>
+              <a:buChar char=""/>
+            </a:pPr>
+            <a:r>
               <a:rPr b="0" lang="en-US" sz="3200" spc="-1" strike="noStrike">
                 <a:latin typeface="Arial"/>
               </a:rPr>
-              <a:t>Emily Risley, Timothy Kudryn, Nicholas Grogg</a:t>
-            </a:r>
-            <a:endParaRPr b="0" lang="en-US" sz="3200" spc="-1" strike="noStrike">
-              <a:latin typeface="Arial"/>
-            </a:endParaRPr>
-          </a:p>
-        </p:txBody>
-      </p:sp>
+              <a:t>CentOS 7 Web </a:t>
+            </a:r>
+            <a:r>
+              <a:rPr b="0" lang="en-US" sz="3200" spc="-1" strike="noStrike">
+                <a:latin typeface="Arial"/>
+              </a:rPr>
+              <a:t>server</a:t>
+            </a:r>
+            <a:endParaRPr b="0" lang="en-US" sz="3200" spc="-1" strike="noStrike">
+              <a:latin typeface="Arial"/>
+            </a:endParaRPr>
+          </a:p>
+          <a:p>
+            <a:pPr marL="432000" indent="-324000">
+              <a:spcBef>
+                <a:spcPts val="1417"/>
+              </a:spcBef>
+              <a:buClr>
+                <a:srgbClr val="000000"/>
+              </a:buClr>
+              <a:buSzPct val="45000"/>
+              <a:buFont typeface="Wingdings" charset="2"/>
+              <a:buChar char=""/>
+            </a:pPr>
+            <a:r>
+              <a:rPr b="0" lang="en-US" sz="3200" spc="-1" strike="noStrike">
+                <a:latin typeface="Arial"/>
+              </a:rPr>
+              <a:t>MariaDB database</a:t>
+            </a:r>
+            <a:endParaRPr b="0" lang="en-US" sz="3200" spc="-1" strike="noStrike">
+              <a:latin typeface="Arial"/>
+            </a:endParaRPr>
+          </a:p>
+          <a:p>
+            <a:pPr lvl="1" marL="864000" indent="-324000">
+              <a:spcBef>
+                <a:spcPts val="1134"/>
+              </a:spcBef>
+              <a:buClr>
+                <a:srgbClr val="000000"/>
+              </a:buClr>
+              <a:buSzPct val="75000"/>
+              <a:buFont typeface="Symbol" charset="2"/>
+              <a:buChar char=""/>
+            </a:pPr>
+            <a:r>
+              <a:rPr b="0" lang="en-US" sz="2800" spc="-1" strike="noStrike">
+                <a:latin typeface="Arial"/>
+              </a:rPr>
+              <a:t>Innodb engine</a:t>
+            </a:r>
+            <a:endParaRPr b="0" lang="en-US" sz="2800" spc="-1" strike="noStrike">
+              <a:latin typeface="Arial"/>
+            </a:endParaRPr>
+          </a:p>
+          <a:p>
+            <a:pPr marL="432000" indent="-324000">
+              <a:spcBef>
+                <a:spcPts val="1417"/>
+              </a:spcBef>
+              <a:buClr>
+                <a:srgbClr val="000000"/>
+              </a:buClr>
+              <a:buSzPct val="45000"/>
+              <a:buFont typeface="Wingdings" charset="2"/>
+              <a:buChar char=""/>
+            </a:pPr>
+            <a:r>
+              <a:rPr b="0" lang="en-US" sz="3200" spc="-1" strike="noStrike">
+                <a:latin typeface="Arial"/>
+              </a:rPr>
+              <a:t>Single table</a:t>
+            </a:r>
+            <a:endParaRPr b="0" lang="en-US" sz="3200" spc="-1" strike="noStrike">
+              <a:latin typeface="Arial"/>
+            </a:endParaRPr>
+          </a:p>
+          <a:p>
+            <a:pPr lvl="1" marL="864000" indent="-324000">
+              <a:spcBef>
+                <a:spcPts val="1134"/>
+              </a:spcBef>
+              <a:buClr>
+                <a:srgbClr val="000000"/>
+              </a:buClr>
+              <a:buSzPct val="75000"/>
+              <a:buFont typeface="Symbol" charset="2"/>
+              <a:buChar char=""/>
+            </a:pPr>
+            <a:r>
+              <a:rPr b="0" lang="en-US" sz="2800" spc="-1" strike="noStrike">
+                <a:latin typeface="Arial"/>
+              </a:rPr>
+              <a:t>Date, state, fips, </a:t>
+            </a:r>
+            <a:r>
+              <a:rPr b="0" lang="en-US" sz="2800" spc="-1" strike="noStrike">
+                <a:latin typeface="Arial"/>
+              </a:rPr>
+              <a:t>cases, deaths</a:t>
+            </a:r>
+            <a:endParaRPr b="0" lang="en-US" sz="2800" spc="-1" strike="noStrike">
+              <a:latin typeface="Arial"/>
+            </a:endParaRPr>
+          </a:p>
+        </p:txBody>
+      </p:sp>
+    </p:spTree>
+  </p:cSld>
+  <mc:AlternateContent>
+    <mc:Choice Requires="p14">
+      <p:transition spd="slow" p14:dur="2000"/>
+    </mc:Choice>
+    <mc:Fallback>
+      <p:transition spd="slow"/>
+    </mc:Fallback>
+  </mc:AlternateContent>
+</p:sld>
+</file>
+
+<file path=ppt/slides/slide12.xml><?xml version="1.0" encoding="utf-8"?>
+<p:sld xmlns:a="http://schemas.openxmlformats.org/drawingml/2006/main" xmlns:p="http://schemas.openxmlformats.org/presentationml/2006/main" xmlns:r="http://schemas.openxmlformats.org/officeDocument/2006/relationships" xmlns:p14="http://schemas.microsoft.com/office/powerpoint/2010/main" xmlns:p15="http://schemas.microsoft.com/office/powerpoint/2012/main" xmlns:mc="http://schemas.openxmlformats.org/markup-compatibility/2006">
+  <p:cSld>
+    <p:spTree>
+      <p:nvGrpSpPr>
+        <p:cNvPr id="1" name=""/>
+        <p:cNvGrpSpPr/>
+        <p:nvPr/>
+      </p:nvGrpSpPr>
+      <p:grpSpPr>
+        <a:xfrm>
+          <a:off x="0" y="0"/>
+          <a:ext cx="0" cy="0"/>
+          <a:chOff x="0" y="0"/>
+          <a:chExt cx="0" cy="0"/>
+        </a:xfrm>
+      </p:grpSpPr>
+      <p:sp>
+        <p:nvSpPr>
+          <p:cNvPr id="96" name="TextShape 1"/>
+          <p:cNvSpPr txBox="1"/>
+          <p:nvPr/>
+        </p:nvSpPr>
+        <p:spPr>
+          <a:xfrm>
+            <a:off x="504000" y="226080"/>
+            <a:ext cx="9071280" cy="946080"/>
+          </a:xfrm>
+          <a:prstGeom prst="rect">
+            <a:avLst/>
+          </a:prstGeom>
+          <a:noFill/>
+          <a:ln>
+            <a:noFill/>
+          </a:ln>
+        </p:spPr>
+        <p:txBody>
+          <a:bodyPr lIns="0" rIns="0" tIns="0" bIns="0" anchor="ctr">
+            <a:noAutofit/>
+          </a:bodyPr>
+          <a:p>
+            <a:pPr algn="ctr"/>
+            <a:r>
+              <a:rPr b="0" lang="en-US" sz="4400" spc="-1" strike="noStrike">
+                <a:latin typeface="Arial"/>
+              </a:rPr>
+              <a:t>Back-end Server</a:t>
+            </a:r>
+            <a:endParaRPr b="0" lang="en-US" sz="4400" spc="-1" strike="noStrike">
+              <a:latin typeface="Arial"/>
+            </a:endParaRPr>
+          </a:p>
+        </p:txBody>
+      </p:sp>
+      <p:sp>
+        <p:nvSpPr>
+          <p:cNvPr id="97" name="TextShape 2"/>
+          <p:cNvSpPr txBox="1"/>
+          <p:nvPr/>
+        </p:nvSpPr>
+        <p:spPr>
+          <a:xfrm>
+            <a:off x="504000" y="1326600"/>
+            <a:ext cx="9071280" cy="3287880"/>
+          </a:xfrm>
+          <a:prstGeom prst="rect">
+            <a:avLst/>
+          </a:prstGeom>
+          <a:noFill/>
+          <a:ln>
+            <a:noFill/>
+          </a:ln>
+        </p:spPr>
+        <p:txBody>
+          <a:bodyPr lIns="0" rIns="0" tIns="0" bIns="0">
+            <a:normAutofit/>
+          </a:bodyPr>
+          <a:p>
+            <a:pPr marL="432000" indent="-324000">
+              <a:spcBef>
+                <a:spcPts val="1417"/>
+              </a:spcBef>
+              <a:buClr>
+                <a:srgbClr val="000000"/>
+              </a:buClr>
+              <a:buSzPct val="45000"/>
+              <a:buFont typeface="Wingdings" charset="2"/>
+              <a:buChar char=""/>
+            </a:pPr>
+            <a:r>
+              <a:rPr b="0" lang="en-US" sz="3200" spc="-1" strike="noStrike">
+                <a:latin typeface="Arial"/>
+              </a:rPr>
+              <a:t>Web based server</a:t>
+            </a:r>
+            <a:endParaRPr b="0" lang="en-US" sz="3200" spc="-1" strike="noStrike">
+              <a:latin typeface="Arial"/>
+            </a:endParaRPr>
+          </a:p>
+          <a:p>
+            <a:pPr marL="432000" indent="-324000">
+              <a:spcBef>
+                <a:spcPts val="1417"/>
+              </a:spcBef>
+              <a:buClr>
+                <a:srgbClr val="000000"/>
+              </a:buClr>
+              <a:buSzPct val="45000"/>
+              <a:buFont typeface="Wingdings" charset="2"/>
+              <a:buChar char=""/>
+            </a:pPr>
+            <a:r>
+              <a:rPr b="0" lang="en-US" sz="3200" spc="-1" strike="noStrike">
+                <a:latin typeface="Arial"/>
+              </a:rPr>
+              <a:t>CentOS 7</a:t>
+            </a:r>
+            <a:endParaRPr b="0" lang="en-US" sz="3200" spc="-1" strike="noStrike">
+              <a:latin typeface="Arial"/>
+            </a:endParaRPr>
+          </a:p>
+          <a:p>
+            <a:pPr lvl="1" marL="864000" indent="-324000">
+              <a:spcBef>
+                <a:spcPts val="1134"/>
+              </a:spcBef>
+              <a:buClr>
+                <a:srgbClr val="000000"/>
+              </a:buClr>
+              <a:buSzPct val="75000"/>
+              <a:buFont typeface="Symbol" charset="2"/>
+              <a:buChar char=""/>
+            </a:pPr>
+            <a:r>
+              <a:rPr b="0" lang="en-US" sz="2800" spc="-1" strike="noStrike">
+                <a:latin typeface="Arial"/>
+              </a:rPr>
+              <a:t>DigitalOcean</a:t>
+            </a:r>
+            <a:endParaRPr b="0" lang="en-US" sz="2800" spc="-1" strike="noStrike">
+              <a:latin typeface="Arial"/>
+            </a:endParaRPr>
+          </a:p>
+          <a:p>
+            <a:pPr lvl="1" marL="864000" indent="-324000">
+              <a:spcBef>
+                <a:spcPts val="1134"/>
+              </a:spcBef>
+              <a:buClr>
+                <a:srgbClr val="000000"/>
+              </a:buClr>
+              <a:buSzPct val="75000"/>
+              <a:buFont typeface="Symbol" charset="2"/>
+              <a:buChar char=""/>
+            </a:pPr>
+            <a:r>
+              <a:rPr b="0" lang="en-US" sz="2800" spc="-1" strike="noStrike">
+                <a:latin typeface="Arial"/>
+              </a:rPr>
+              <a:t>Chose for stability, Documentation</a:t>
+            </a:r>
+            <a:endParaRPr b="0" lang="en-US" sz="2800" spc="-1" strike="noStrike">
+              <a:latin typeface="Arial"/>
+            </a:endParaRPr>
+          </a:p>
+          <a:p>
+            <a:pPr lvl="1" marL="864000" indent="-324000">
+              <a:spcBef>
+                <a:spcPts val="1134"/>
+              </a:spcBef>
+              <a:buClr>
+                <a:srgbClr val="000000"/>
+              </a:buClr>
+              <a:buSzPct val="75000"/>
+              <a:buFont typeface="Symbol" charset="2"/>
+              <a:buChar char=""/>
+            </a:pPr>
+            <a:r>
+              <a:rPr b="0" lang="en-US" sz="2800" spc="-1" strike="noStrike">
+                <a:latin typeface="Arial"/>
+              </a:rPr>
+              <a:t>LM, no MP</a:t>
+            </a:r>
+            <a:endParaRPr b="0" lang="en-US" sz="2800" spc="-1" strike="noStrike">
+              <a:latin typeface="Arial"/>
+            </a:endParaRPr>
+          </a:p>
+          <a:p>
+            <a:pPr lvl="2" marL="1296000" indent="-288000">
+              <a:spcBef>
+                <a:spcPts val="850"/>
+              </a:spcBef>
+              <a:buClr>
+                <a:srgbClr val="000000"/>
+              </a:buClr>
+              <a:buSzPct val="45000"/>
+              <a:buFont typeface="Wingdings" charset="2"/>
+              <a:buChar char=""/>
+            </a:pPr>
+            <a:r>
+              <a:rPr b="0" lang="en-US" sz="2400" spc="-1" strike="noStrike">
+                <a:latin typeface="Arial"/>
+              </a:rPr>
+              <a:t>LAMP stack</a:t>
+            </a:r>
+            <a:endParaRPr b="0" lang="en-US" sz="2400" spc="-1" strike="noStrike">
+              <a:latin typeface="Arial"/>
+            </a:endParaRPr>
+          </a:p>
+        </p:txBody>
+      </p:sp>
+    </p:spTree>
+  </p:cSld>
+  <mc:AlternateContent>
+    <mc:Choice Requires="p14">
+      <p:transition spd="slow" p14:dur="2000"/>
+    </mc:Choice>
+    <mc:Fallback>
+      <p:transition spd="slow"/>
+    </mc:Fallback>
+  </mc:AlternateContent>
+</p:sld>
+</file>
+
+<file path=ppt/slides/slide13.xml><?xml version="1.0" encoding="utf-8"?>
+<p:sld xmlns:a="http://schemas.openxmlformats.org/drawingml/2006/main" xmlns:p="http://schemas.openxmlformats.org/presentationml/2006/main" xmlns:r="http://schemas.openxmlformats.org/officeDocument/2006/relationships" xmlns:p14="http://schemas.microsoft.com/office/powerpoint/2010/main" xmlns:p15="http://schemas.microsoft.com/office/powerpoint/2012/main" xmlns:mc="http://schemas.openxmlformats.org/markup-compatibility/2006">
+  <p:cSld>
+    <p:spTree>
+      <p:nvGrpSpPr>
+        <p:cNvPr id="1" name=""/>
+        <p:cNvGrpSpPr/>
+        <p:nvPr/>
+      </p:nvGrpSpPr>
+      <p:grpSpPr>
+        <a:xfrm>
+          <a:off x="0" y="0"/>
+          <a:ext cx="0" cy="0"/>
+          <a:chOff x="0" y="0"/>
+          <a:chExt cx="0" cy="0"/>
+        </a:xfrm>
+      </p:grpSpPr>
+      <p:sp>
+        <p:nvSpPr>
+          <p:cNvPr id="98" name="TextShape 1"/>
+          <p:cNvSpPr txBox="1"/>
+          <p:nvPr/>
+        </p:nvSpPr>
+        <p:spPr>
+          <a:xfrm>
+            <a:off x="504000" y="226080"/>
+            <a:ext cx="9071280" cy="946080"/>
+          </a:xfrm>
+          <a:prstGeom prst="rect">
+            <a:avLst/>
+          </a:prstGeom>
+          <a:noFill/>
+          <a:ln>
+            <a:noFill/>
+          </a:ln>
+        </p:spPr>
+        <p:txBody>
+          <a:bodyPr lIns="0" rIns="0" tIns="0" bIns="0" anchor="ctr">
+            <a:noAutofit/>
+          </a:bodyPr>
+          <a:p>
+            <a:pPr algn="ctr"/>
+            <a:r>
+              <a:rPr b="0" lang="en-US" sz="4400" spc="-1" strike="noStrike">
+                <a:latin typeface="Arial"/>
+              </a:rPr>
+              <a:t>Back-end Database</a:t>
+            </a:r>
+            <a:endParaRPr b="0" lang="en-US" sz="4400" spc="-1" strike="noStrike">
+              <a:latin typeface="Arial"/>
+            </a:endParaRPr>
+          </a:p>
+        </p:txBody>
+      </p:sp>
+      <p:sp>
+        <p:nvSpPr>
+          <p:cNvPr id="99" name="TextShape 2"/>
+          <p:cNvSpPr txBox="1"/>
+          <p:nvPr/>
+        </p:nvSpPr>
+        <p:spPr>
+          <a:xfrm>
+            <a:off x="504000" y="1326600"/>
+            <a:ext cx="9071280" cy="3287880"/>
+          </a:xfrm>
+          <a:prstGeom prst="rect">
+            <a:avLst/>
+          </a:prstGeom>
+          <a:noFill/>
+          <a:ln>
+            <a:noFill/>
+          </a:ln>
+        </p:spPr>
+        <p:txBody>
+          <a:bodyPr lIns="0" rIns="0" tIns="0" bIns="0">
+            <a:normAutofit fontScale="52000"/>
+          </a:bodyPr>
+          <a:p>
+            <a:pPr marL="432000" indent="-324000">
+              <a:spcBef>
+                <a:spcPts val="1417"/>
+              </a:spcBef>
+              <a:buClr>
+                <a:srgbClr val="000000"/>
+              </a:buClr>
+              <a:buSzPct val="45000"/>
+              <a:buFont typeface="Wingdings" charset="2"/>
+              <a:buChar char=""/>
+            </a:pPr>
+            <a:r>
+              <a:rPr b="0" lang="en-US" sz="3200" spc="-1" strike="noStrike">
+                <a:latin typeface="Arial"/>
+              </a:rPr>
+              <a:t>Composite primary key</a:t>
+            </a:r>
+            <a:endParaRPr b="0" lang="en-US" sz="3200" spc="-1" strike="noStrike">
+              <a:latin typeface="Arial"/>
+            </a:endParaRPr>
+          </a:p>
+          <a:p>
+            <a:pPr lvl="1" marL="864000" indent="-324000">
+              <a:spcBef>
+                <a:spcPts val="1134"/>
+              </a:spcBef>
+              <a:buClr>
+                <a:srgbClr val="000000"/>
+              </a:buClr>
+              <a:buSzPct val="75000"/>
+              <a:buFont typeface="Symbol" charset="2"/>
+              <a:buChar char=""/>
+            </a:pPr>
+            <a:r>
+              <a:rPr b="0" lang="en-US" sz="2800" spc="-1" strike="noStrike">
+                <a:latin typeface="Arial"/>
+              </a:rPr>
+              <a:t>Date, state, cases</a:t>
+            </a:r>
+            <a:endParaRPr b="0" lang="en-US" sz="2800" spc="-1" strike="noStrike">
+              <a:latin typeface="Arial"/>
+            </a:endParaRPr>
+          </a:p>
+          <a:p>
+            <a:pPr marL="432000" indent="-324000">
+              <a:spcBef>
+                <a:spcPts val="1417"/>
+              </a:spcBef>
+              <a:buClr>
+                <a:srgbClr val="000000"/>
+              </a:buClr>
+              <a:buSzPct val="45000"/>
+              <a:buFont typeface="Wingdings" charset="2"/>
+              <a:buChar char=""/>
+            </a:pPr>
+            <a:r>
+              <a:rPr b="0" lang="en-US" sz="3200" spc="-1" strike="noStrike">
+                <a:latin typeface="Arial"/>
+              </a:rPr>
+              <a:t>FIPS</a:t>
+            </a:r>
+            <a:endParaRPr b="0" lang="en-US" sz="3200" spc="-1" strike="noStrike">
+              <a:latin typeface="Arial"/>
+            </a:endParaRPr>
+          </a:p>
+          <a:p>
+            <a:pPr lvl="1" marL="864000" indent="-324000">
+              <a:spcBef>
+                <a:spcPts val="1134"/>
+              </a:spcBef>
+              <a:buClr>
+                <a:srgbClr val="000000"/>
+              </a:buClr>
+              <a:buSzPct val="75000"/>
+              <a:buFont typeface="Symbol" charset="2"/>
+              <a:buChar char=""/>
+            </a:pPr>
+            <a:r>
+              <a:rPr b="0" lang="en-US" sz="2800" spc="-1" strike="noStrike">
+                <a:latin typeface="Arial"/>
+              </a:rPr>
+              <a:t>Two digit code to ID state</a:t>
+            </a:r>
+            <a:endParaRPr b="0" lang="en-US" sz="2800" spc="-1" strike="noStrike">
+              <a:latin typeface="Arial"/>
+            </a:endParaRPr>
+          </a:p>
+          <a:p>
+            <a:pPr lvl="2" marL="1296000" indent="-288000">
+              <a:spcBef>
+                <a:spcPts val="850"/>
+              </a:spcBef>
+              <a:buClr>
+                <a:srgbClr val="000000"/>
+              </a:buClr>
+              <a:buSzPct val="45000"/>
+              <a:buFont typeface="Wingdings" charset="2"/>
+              <a:buChar char=""/>
+            </a:pPr>
+            <a:r>
+              <a:rPr b="0" lang="en-US" sz="2400" spc="-1" strike="noStrike">
+                <a:latin typeface="Arial"/>
+              </a:rPr>
+              <a:t>Hawaii’s is 15</a:t>
+            </a:r>
+            <a:endParaRPr b="0" lang="en-US" sz="2400" spc="-1" strike="noStrike">
+              <a:latin typeface="Arial"/>
+            </a:endParaRPr>
+          </a:p>
+          <a:p>
+            <a:pPr marL="432000" indent="-324000">
+              <a:spcBef>
+                <a:spcPts val="1417"/>
+              </a:spcBef>
+              <a:buClr>
+                <a:srgbClr val="000000"/>
+              </a:buClr>
+              <a:buSzPct val="45000"/>
+              <a:buFont typeface="Wingdings" charset="2"/>
+              <a:buChar char=""/>
+            </a:pPr>
+            <a:r>
+              <a:rPr b="0" lang="en-US" sz="3200" spc="-1" strike="noStrike">
+                <a:latin typeface="Arial"/>
+              </a:rPr>
+              <a:t>Chose Innodb for atomic nature</a:t>
+            </a:r>
+            <a:endParaRPr b="0" lang="en-US" sz="3200" spc="-1" strike="noStrike">
+              <a:latin typeface="Arial"/>
+            </a:endParaRPr>
+          </a:p>
+          <a:p>
+            <a:pPr lvl="1" marL="864000" indent="-324000">
+              <a:spcBef>
+                <a:spcPts val="1134"/>
+              </a:spcBef>
+              <a:buClr>
+                <a:srgbClr val="000000"/>
+              </a:buClr>
+              <a:buSzPct val="75000"/>
+              <a:buFont typeface="Symbol" charset="2"/>
+              <a:buChar char=""/>
+            </a:pPr>
+            <a:r>
+              <a:rPr b="0" lang="en-US" sz="2800" spc="-1" strike="noStrike">
+                <a:latin typeface="Arial"/>
+              </a:rPr>
+              <a:t>Fails or succeeds completely</a:t>
+            </a:r>
+            <a:endParaRPr b="0" lang="en-US" sz="2800" spc="-1" strike="noStrike">
+              <a:latin typeface="Arial"/>
+            </a:endParaRPr>
+          </a:p>
+          <a:p>
+            <a:pPr marL="432000" indent="-324000">
+              <a:spcBef>
+                <a:spcPts val="1417"/>
+              </a:spcBef>
+              <a:buClr>
+                <a:srgbClr val="000000"/>
+              </a:buClr>
+              <a:buSzPct val="45000"/>
+              <a:buFont typeface="Wingdings" charset="2"/>
+              <a:buChar char=""/>
+            </a:pPr>
+            <a:r>
+              <a:rPr b="0" lang="en-US" sz="3200" spc="-1" strike="noStrike">
+                <a:latin typeface="Arial"/>
+              </a:rPr>
+              <a:t>No indexing</a:t>
+            </a:r>
+            <a:endParaRPr b="0" lang="en-US" sz="3200" spc="-1" strike="noStrike">
+              <a:latin typeface="Arial"/>
+            </a:endParaRPr>
+          </a:p>
+          <a:p>
+            <a:pPr lvl="1" marL="864000" indent="-324000">
+              <a:spcBef>
+                <a:spcPts val="1134"/>
+              </a:spcBef>
+              <a:buClr>
+                <a:srgbClr val="000000"/>
+              </a:buClr>
+              <a:buSzPct val="75000"/>
+              <a:buFont typeface="Symbol" charset="2"/>
+              <a:buChar char=""/>
+            </a:pPr>
+            <a:r>
+              <a:rPr b="0" lang="en-US" sz="2800" spc="-1" strike="noStrike">
+                <a:latin typeface="Arial"/>
+              </a:rPr>
+              <a:t>Would have done so on date</a:t>
+            </a:r>
+            <a:endParaRPr b="0" lang="en-US" sz="2800" spc="-1" strike="noStrike">
+              <a:latin typeface="Arial"/>
+            </a:endParaRPr>
+          </a:p>
+        </p:txBody>
+      </p:sp>
+    </p:spTree>
+  </p:cSld>
+  <mc:AlternateContent>
+    <mc:Choice Requires="p14">
+      <p:transition spd="slow" p14:dur="2000"/>
+    </mc:Choice>
+    <mc:Fallback>
+      <p:transition spd="slow"/>
+    </mc:Fallback>
+  </mc:AlternateContent>
+</p:sld>
+</file>
+
+<file path=ppt/slides/slide14.xml><?xml version="1.0" encoding="utf-8"?>
+<p:sld xmlns:a="http://schemas.openxmlformats.org/drawingml/2006/main" xmlns:p="http://schemas.openxmlformats.org/presentationml/2006/main" xmlns:r="http://schemas.openxmlformats.org/officeDocument/2006/relationships" xmlns:p14="http://schemas.microsoft.com/office/powerpoint/2010/main" xmlns:p15="http://schemas.microsoft.com/office/powerpoint/2012/main" xmlns:mc="http://schemas.openxmlformats.org/markup-compatibility/2006">
+  <p:cSld>
+    <p:spTree>
+      <p:nvGrpSpPr>
+        <p:cNvPr id="1" name=""/>
+        <p:cNvGrpSpPr/>
+        <p:nvPr/>
+      </p:nvGrpSpPr>
+      <p:grpSpPr>
+        <a:xfrm>
+          <a:off x="0" y="0"/>
+          <a:ext cx="0" cy="0"/>
+          <a:chOff x="0" y="0"/>
+          <a:chExt cx="0" cy="0"/>
+        </a:xfrm>
+      </p:grpSpPr>
+      <p:sp>
+        <p:nvSpPr>
+          <p:cNvPr id="100" name="TextShape 1"/>
+          <p:cNvSpPr txBox="1"/>
+          <p:nvPr/>
+        </p:nvSpPr>
+        <p:spPr>
+          <a:xfrm>
+            <a:off x="504000" y="226080"/>
+            <a:ext cx="9071280" cy="946080"/>
+          </a:xfrm>
+          <a:prstGeom prst="rect">
+            <a:avLst/>
+          </a:prstGeom>
+          <a:noFill/>
+          <a:ln>
+            <a:noFill/>
+          </a:ln>
+        </p:spPr>
+        <p:txBody>
+          <a:bodyPr lIns="0" rIns="0" tIns="0" bIns="0" anchor="ctr">
+            <a:noAutofit/>
+          </a:bodyPr>
+          <a:p>
+            <a:pPr algn="ctr"/>
+            <a:r>
+              <a:rPr b="0" lang="en-US" sz="4400" spc="-1" strike="noStrike">
+                <a:latin typeface="Arial"/>
+              </a:rPr>
+              <a:t>Back-end ER Diagram</a:t>
+            </a:r>
+            <a:endParaRPr b="0" lang="en-US" sz="4400" spc="-1" strike="noStrike">
+              <a:latin typeface="Arial"/>
+            </a:endParaRPr>
+          </a:p>
+        </p:txBody>
+      </p:sp>
+      <p:sp>
+        <p:nvSpPr>
+          <p:cNvPr id="101" name="TextShape 2"/>
+          <p:cNvSpPr txBox="1"/>
+          <p:nvPr/>
+        </p:nvSpPr>
+        <p:spPr>
+          <a:xfrm>
+            <a:off x="504000" y="1523160"/>
+            <a:ext cx="4426560" cy="2894040"/>
+          </a:xfrm>
+          <a:prstGeom prst="rect">
+            <a:avLst/>
+          </a:prstGeom>
+          <a:noFill/>
+          <a:ln>
+            <a:noFill/>
+          </a:ln>
+        </p:spPr>
+        <p:txBody>
+          <a:bodyPr lIns="0" rIns="0" tIns="0" bIns="0">
+            <a:normAutofit fontScale="80000"/>
+          </a:bodyPr>
+          <a:p>
+            <a:pPr marL="432000" indent="-324000">
+              <a:spcBef>
+                <a:spcPts val="1417"/>
+              </a:spcBef>
+              <a:buClr>
+                <a:srgbClr val="000000"/>
+              </a:buClr>
+              <a:buSzPct val="45000"/>
+              <a:buFont typeface="Wingdings" charset="2"/>
+              <a:buChar char=""/>
+            </a:pPr>
+            <a:r>
+              <a:rPr b="0" lang="en-US" sz="3200" spc="-1" strike="noStrike">
+                <a:latin typeface="Arial"/>
+              </a:rPr>
+              <a:t>Underlined</a:t>
+            </a:r>
+            <a:endParaRPr b="0" lang="en-US" sz="3200" spc="-1" strike="noStrike">
+              <a:latin typeface="Arial"/>
+            </a:endParaRPr>
+          </a:p>
+          <a:p>
+            <a:pPr lvl="1" marL="864000" indent="-324000">
+              <a:spcBef>
+                <a:spcPts val="1134"/>
+              </a:spcBef>
+              <a:buClr>
+                <a:srgbClr val="000000"/>
+              </a:buClr>
+              <a:buSzPct val="75000"/>
+              <a:buFont typeface="Symbol" charset="2"/>
+              <a:buChar char=""/>
+            </a:pPr>
+            <a:r>
+              <a:rPr b="0" lang="en-US" sz="2800" spc="-1" strike="noStrike">
+                <a:latin typeface="Arial"/>
+              </a:rPr>
+              <a:t>Primary key</a:t>
+            </a:r>
+            <a:endParaRPr b="0" lang="en-US" sz="2800" spc="-1" strike="noStrike">
+              <a:latin typeface="Arial"/>
+            </a:endParaRPr>
+          </a:p>
+          <a:p>
+            <a:pPr marL="432000" indent="-324000">
+              <a:spcBef>
+                <a:spcPts val="1417"/>
+              </a:spcBef>
+              <a:buClr>
+                <a:srgbClr val="000000"/>
+              </a:buClr>
+              <a:buSzPct val="45000"/>
+              <a:buFont typeface="Wingdings" charset="2"/>
+              <a:buChar char=""/>
+            </a:pPr>
+            <a:r>
+              <a:rPr b="0" lang="en-US" sz="3200" spc="-1" strike="noStrike">
+                <a:latin typeface="Arial"/>
+              </a:rPr>
+              <a:t>Solid</a:t>
+            </a:r>
+            <a:endParaRPr b="0" lang="en-US" sz="3200" spc="-1" strike="noStrike">
+              <a:latin typeface="Arial"/>
+            </a:endParaRPr>
+          </a:p>
+          <a:p>
+            <a:pPr lvl="1" marL="864000" indent="-324000">
+              <a:spcBef>
+                <a:spcPts val="1134"/>
+              </a:spcBef>
+              <a:buClr>
+                <a:srgbClr val="000000"/>
+              </a:buClr>
+              <a:buSzPct val="75000"/>
+              <a:buFont typeface="Symbol" charset="2"/>
+              <a:buChar char=""/>
+            </a:pPr>
+            <a:r>
+              <a:rPr b="0" lang="en-US" sz="2800" spc="-1" strike="noStrike">
+                <a:latin typeface="Arial"/>
+              </a:rPr>
+              <a:t>Not null</a:t>
+            </a:r>
+            <a:endParaRPr b="0" lang="en-US" sz="2800" spc="-1" strike="noStrike">
+              <a:latin typeface="Arial"/>
+            </a:endParaRPr>
+          </a:p>
+          <a:p>
+            <a:pPr marL="432000" indent="-324000">
+              <a:spcBef>
+                <a:spcPts val="1417"/>
+              </a:spcBef>
+              <a:buClr>
+                <a:srgbClr val="000000"/>
+              </a:buClr>
+              <a:buSzPct val="45000"/>
+              <a:buFont typeface="Wingdings" charset="2"/>
+              <a:buChar char=""/>
+            </a:pPr>
+            <a:r>
+              <a:rPr b="0" lang="en-US" sz="3200" spc="-1" strike="noStrike">
+                <a:latin typeface="Arial"/>
+              </a:rPr>
+              <a:t>Hollow</a:t>
+            </a:r>
+            <a:endParaRPr b="0" lang="en-US" sz="3200" spc="-1" strike="noStrike">
+              <a:latin typeface="Arial"/>
+            </a:endParaRPr>
+          </a:p>
+          <a:p>
+            <a:pPr lvl="1" marL="864000" indent="-324000">
+              <a:spcBef>
+                <a:spcPts val="1134"/>
+              </a:spcBef>
+              <a:buClr>
+                <a:srgbClr val="000000"/>
+              </a:buClr>
+              <a:buSzPct val="75000"/>
+              <a:buFont typeface="Symbol" charset="2"/>
+              <a:buChar char=""/>
+            </a:pPr>
+            <a:r>
+              <a:rPr b="0" lang="en-US" sz="2800" spc="-1" strike="noStrike">
+                <a:latin typeface="Arial"/>
+              </a:rPr>
+              <a:t>Can be null</a:t>
+            </a:r>
+            <a:endParaRPr b="0" lang="en-US" sz="2800" spc="-1" strike="noStrike">
+              <a:latin typeface="Arial"/>
+            </a:endParaRPr>
+          </a:p>
+        </p:txBody>
+      </p:sp>
+      <p:pic>
+        <p:nvPicPr>
+          <p:cNvPr id="102" name="" descr=""/>
+          <p:cNvPicPr/>
+          <p:nvPr/>
+        </p:nvPicPr>
+        <p:blipFill>
+          <a:blip r:embed="rId1"/>
+          <a:stretch/>
+        </p:blipFill>
+        <p:spPr>
+          <a:xfrm>
+            <a:off x="5152320" y="1523160"/>
+            <a:ext cx="4426560" cy="2894040"/>
+          </a:xfrm>
+          <a:prstGeom prst="rect">
+            <a:avLst/>
+          </a:prstGeom>
+          <a:ln>
+            <a:noFill/>
+          </a:ln>
+        </p:spPr>
+      </p:pic>
     </p:spTree>
   </p:cSld>
   <mc:AlternateContent>
@@ -1856,14 +4465,14 @@
       </p:grpSpPr>
       <p:sp>
         <p:nvSpPr>
-          <p:cNvPr id="43" name="TextShape 1"/>
+          <p:cNvPr id="78" name="TextShape 1"/>
           <p:cNvSpPr txBox="1"/>
           <p:nvPr/>
         </p:nvSpPr>
         <p:spPr>
           <a:xfrm>
             <a:off x="504000" y="226080"/>
-            <a:ext cx="9071640" cy="946440"/>
+            <a:ext cx="9071280" cy="4386600"/>
           </a:xfrm>
           <a:prstGeom prst="rect">
             <a:avLst/>
@@ -1880,123 +4489,10 @@
           <a:p>
             <a:pPr algn="ctr"/>
             <a:r>
-              <a:rPr b="0" lang="en-US" sz="4400" spc="-1" strike="noStrike">
-                <a:latin typeface="Arial"/>
-              </a:rPr>
-              <a:t>Project overview</a:t>
-            </a:r>
-            <a:endParaRPr b="0" lang="en-US" sz="4400" spc="-1" strike="noStrike">
-              <a:latin typeface="Arial"/>
-            </a:endParaRPr>
-          </a:p>
-        </p:txBody>
-      </p:sp>
-      <p:sp>
-        <p:nvSpPr>
-          <p:cNvPr id="44" name="TextShape 2"/>
-          <p:cNvSpPr txBox="1"/>
-          <p:nvPr/>
-        </p:nvSpPr>
-        <p:spPr>
-          <a:xfrm>
-            <a:off x="504000" y="1326600"/>
-            <a:ext cx="9071640" cy="3288240"/>
-          </a:xfrm>
-          <a:prstGeom prst="rect">
-            <a:avLst/>
-          </a:prstGeom>
-          <a:noFill/>
-          <a:ln>
-            <a:noFill/>
-          </a:ln>
-        </p:spPr>
-        <p:txBody>
-          <a:bodyPr lIns="0" rIns="0" tIns="0" bIns="0">
-            <a:normAutofit/>
-          </a:bodyPr>
-          <a:p>
-            <a:pPr marL="432000" indent="-324000">
-              <a:spcBef>
-                <a:spcPts val="1417"/>
-              </a:spcBef>
-              <a:buClr>
-                <a:srgbClr val="000000"/>
-              </a:buClr>
-              <a:buSzPct val="45000"/>
-              <a:buFont typeface="Wingdings" charset="2"/>
-              <a:buChar char=""/>
-            </a:pPr>
-            <a:r>
               <a:rPr b="0" lang="en-US" sz="3200" spc="-1" strike="noStrike">
                 <a:latin typeface="Arial"/>
               </a:rPr>
-              <a:t>Mapping application</a:t>
-            </a:r>
-            <a:endParaRPr b="0" lang="en-US" sz="3200" spc="-1" strike="noStrike">
-              <a:latin typeface="Arial"/>
-            </a:endParaRPr>
-          </a:p>
-          <a:p>
-            <a:pPr lvl="1" marL="864000" indent="-324000">
-              <a:spcBef>
-                <a:spcPts val="1134"/>
-              </a:spcBef>
-              <a:buClr>
-                <a:srgbClr val="000000"/>
-              </a:buClr>
-              <a:buSzPct val="75000"/>
-              <a:buFont typeface="Symbol" charset="2"/>
-              <a:buChar char=""/>
-            </a:pPr>
-            <a:r>
-              <a:rPr b="0" lang="en-US" sz="2800" spc="-1" strike="noStrike">
-                <a:latin typeface="Arial"/>
-              </a:rPr>
-              <a:t>Maps COVID 19 data</a:t>
-            </a:r>
-            <a:endParaRPr b="0" lang="en-US" sz="2800" spc="-1" strike="noStrike">
-              <a:latin typeface="Arial"/>
-            </a:endParaRPr>
-          </a:p>
-          <a:p>
-            <a:pPr marL="432000" indent="-324000">
-              <a:spcBef>
-                <a:spcPts val="1417"/>
-              </a:spcBef>
-              <a:buClr>
-                <a:srgbClr val="000000"/>
-              </a:buClr>
-              <a:buSzPct val="45000"/>
-              <a:buFont typeface="Wingdings" charset="2"/>
-              <a:buChar char=""/>
-            </a:pPr>
-            <a:r>
-              <a:rPr b="0" lang="en-US" sz="3200" spc="-1" strike="noStrike">
-                <a:latin typeface="Arial"/>
-              </a:rPr>
-              <a:t>GUI with web hosted backend</a:t>
-            </a:r>
-            <a:endParaRPr b="0" lang="en-US" sz="3200" spc="-1" strike="noStrike">
-              <a:latin typeface="Arial"/>
-            </a:endParaRPr>
-          </a:p>
-          <a:p>
-            <a:pPr marL="432000" indent="-324000">
-              <a:spcBef>
-                <a:spcPts val="1417"/>
-              </a:spcBef>
-              <a:buClr>
-                <a:srgbClr val="000000"/>
-              </a:buClr>
-              <a:buSzPct val="45000"/>
-              <a:buFont typeface="Wingdings" charset="2"/>
-              <a:buChar char=""/>
-            </a:pPr>
-            <a:r>
-              <a:rPr b="0" lang="en-US" sz="3200" spc="-1" strike="noStrike">
-                <a:latin typeface="Arial"/>
-              </a:rPr>
-              <a:t>Python and MariaDB</a:t>
+              <a:t>Section 1: Academics</a:t>
             </a:r>
             <a:endParaRPr b="0" lang="en-US" sz="3200" spc="-1" strike="noStrike">
               <a:latin typeface="Arial"/>
@@ -2036,14 +4532,14 @@
       </p:grpSpPr>
       <p:sp>
         <p:nvSpPr>
-          <p:cNvPr id="45" name="TextShape 1"/>
+          <p:cNvPr id="79" name="TextShape 1"/>
           <p:cNvSpPr txBox="1"/>
           <p:nvPr/>
         </p:nvSpPr>
         <p:spPr>
           <a:xfrm>
             <a:off x="504000" y="226080"/>
-            <a:ext cx="9071640" cy="946440"/>
+            <a:ext cx="9071280" cy="946080"/>
           </a:xfrm>
           <a:prstGeom prst="rect">
             <a:avLst/>
@@ -2063,7 +4559,7 @@
               <a:rPr b="0" lang="en-US" sz="4400" spc="-1" strike="noStrike">
                 <a:latin typeface="Arial"/>
               </a:rPr>
-              <a:t>User roles</a:t>
+              <a:t>What was the problem?</a:t>
             </a:r>
             <a:endParaRPr b="0" lang="en-US" sz="4400" spc="-1" strike="noStrike">
               <a:latin typeface="Arial"/>
@@ -2073,14 +4569,14 @@
       </p:sp>
       <p:sp>
         <p:nvSpPr>
-          <p:cNvPr id="46" name="TextShape 2"/>
+          <p:cNvPr id="80" name="TextShape 2"/>
           <p:cNvSpPr txBox="1"/>
           <p:nvPr/>
         </p:nvSpPr>
         <p:spPr>
           <a:xfrm>
             <a:off x="504000" y="1326600"/>
-            <a:ext cx="9071640" cy="3288240"/>
+            <a:ext cx="9071280" cy="3287880"/>
           </a:xfrm>
           <a:prstGeom prst="rect">
             <a:avLst/>
@@ -2092,7 +4588,104 @@
         </p:spPr>
         <p:txBody>
           <a:bodyPr lIns="0" rIns="0" tIns="0" bIns="0">
-            <a:normAutofit fontScale="97000"/>
+            <a:normAutofit/>
+          </a:bodyPr>
+          <a:p>
+            <a:endParaRPr b="0" lang="en-US" sz="3200" spc="-1" strike="noStrike">
+              <a:latin typeface="Arial"/>
+            </a:endParaRPr>
+          </a:p>
+        </p:txBody>
+      </p:sp>
+    </p:spTree>
+  </p:cSld>
+  <mc:AlternateContent>
+    <mc:Choice Requires="p14">
+      <p:transition spd="slow" p14:dur="2000"/>
+    </mc:Choice>
+    <mc:Fallback>
+      <p:transition spd="slow"/>
+    </mc:Fallback>
+  </mc:AlternateContent>
+</p:sld>
+</file>
+
+<file path=ppt/slides/slide4.xml><?xml version="1.0" encoding="utf-8"?>
+<p:sld xmlns:a="http://schemas.openxmlformats.org/drawingml/2006/main" xmlns:p="http://schemas.openxmlformats.org/presentationml/2006/main" xmlns:r="http://schemas.openxmlformats.org/officeDocument/2006/relationships" xmlns:p14="http://schemas.microsoft.com/office/powerpoint/2010/main" xmlns:p15="http://schemas.microsoft.com/office/powerpoint/2012/main" xmlns:mc="http://schemas.openxmlformats.org/markup-compatibility/2006">
+  <p:cSld>
+    <p:spTree>
+      <p:nvGrpSpPr>
+        <p:cNvPr id="1" name=""/>
+        <p:cNvGrpSpPr/>
+        <p:nvPr/>
+      </p:nvGrpSpPr>
+      <p:grpSpPr>
+        <a:xfrm>
+          <a:off x="0" y="0"/>
+          <a:ext cx="0" cy="0"/>
+          <a:chOff x="0" y="0"/>
+          <a:chExt cx="0" cy="0"/>
+        </a:xfrm>
+      </p:grpSpPr>
+      <p:sp>
+        <p:nvSpPr>
+          <p:cNvPr id="81" name="TextShape 1"/>
+          <p:cNvSpPr txBox="1"/>
+          <p:nvPr/>
+        </p:nvSpPr>
+        <p:spPr>
+          <a:xfrm>
+            <a:off x="504000" y="226080"/>
+            <a:ext cx="9071280" cy="946080"/>
+          </a:xfrm>
+          <a:prstGeom prst="rect">
+            <a:avLst/>
+          </a:prstGeom>
+          <a:noFill/>
+          <a:ln>
+            <a:noFill/>
+          </a:ln>
+        </p:spPr>
+        <p:txBody>
+          <a:bodyPr lIns="0" rIns="0" tIns="0" bIns="0" anchor="ctr">
+            <a:noAutofit/>
+          </a:bodyPr>
+          <a:p>
+            <a:pPr algn="ctr"/>
+            <a:r>
+              <a:rPr b="0" lang="en-US" sz="4400" spc="-1" strike="noStrike">
+                <a:latin typeface="Arial"/>
+              </a:rPr>
+              <a:t>How did we solve it?</a:t>
+            </a:r>
+            <a:endParaRPr b="0" lang="en-US" sz="4400" spc="-1" strike="noStrike">
+              <a:latin typeface="Arial"/>
+            </a:endParaRPr>
+          </a:p>
+        </p:txBody>
+      </p:sp>
+      <p:sp>
+        <p:nvSpPr>
+          <p:cNvPr id="82" name="TextShape 2"/>
+          <p:cNvSpPr txBox="1"/>
+          <p:nvPr/>
+        </p:nvSpPr>
+        <p:spPr>
+          <a:xfrm>
+            <a:off x="504000" y="1326600"/>
+            <a:ext cx="9071280" cy="3287880"/>
+          </a:xfrm>
+          <a:prstGeom prst="rect">
+            <a:avLst/>
+          </a:prstGeom>
+          <a:noFill/>
+          <a:ln>
+            <a:noFill/>
+          </a:ln>
+        </p:spPr>
+        <p:txBody>
+          <a:bodyPr lIns="0" rIns="0" tIns="0" bIns="0">
+            <a:normAutofit/>
           </a:bodyPr>
           <a:p>
             <a:pPr marL="432000" indent="-324000">
@@ -2110,31 +4703,9 @@
               <a:rPr b="0" lang="en-US" sz="3200" spc="-1" strike="noStrike">
                 <a:latin typeface="Arial"/>
               </a:rPr>
-              <a:t>Emily Risley</a:t>
-            </a:r>
-            <a:endParaRPr b="0" lang="en-US" sz="3200" spc="-1" strike="noStrike">
-              <a:latin typeface="Arial"/>
-            </a:endParaRPr>
-          </a:p>
-          <a:p>
-            <a:pPr lvl="1" marL="864000" indent="-324000">
-              <a:spcBef>
-                <a:spcPts val="1134"/>
-              </a:spcBef>
-              <a:buClr>
-                <a:srgbClr val="000000"/>
-              </a:buClr>
-              <a:buSzPct val="75000"/>
-              <a:buFont typeface="Symbol" charset="2"/>
-              <a:buChar char=""/>
-            </a:pPr>
-            <a:r>
-              <a:rPr b="0" lang="en-US" sz="2800" spc="-1" strike="noStrike">
-                <a:latin typeface="Arial"/>
-              </a:rPr>
-              <a:t>Team lead, GUI development</a:t>
-            </a:r>
-            <a:endParaRPr b="0" lang="en-US" sz="2800" spc="-1" strike="noStrike">
+              <a:t>Python front-end</a:t>
+            </a:r>
+            <a:endParaRPr b="0" lang="en-US" sz="3200" spc="-1" strike="noStrike">
               <a:latin typeface="Arial"/>
             </a:endParaRPr>
           </a:p>
@@ -2154,31 +4725,9 @@
               <a:rPr b="0" lang="en-US" sz="3200" spc="-1" strike="noStrike">
                 <a:latin typeface="Arial"/>
               </a:rPr>
-              <a:t>Timothy Kudryn</a:t>
-            </a:r>
-            <a:endParaRPr b="0" lang="en-US" sz="3200" spc="-1" strike="noStrike">
-              <a:latin typeface="Arial"/>
-            </a:endParaRPr>
-          </a:p>
-          <a:p>
-            <a:pPr lvl="1" marL="864000" indent="-324000">
-              <a:spcBef>
-                <a:spcPts val="1134"/>
-              </a:spcBef>
-              <a:buClr>
-                <a:srgbClr val="000000"/>
-              </a:buClr>
-              <a:buSzPct val="75000"/>
-              <a:buFont typeface="Symbol" charset="2"/>
-              <a:buChar char=""/>
-            </a:pPr>
-            <a:r>
-              <a:rPr b="0" lang="en-US" sz="2800" spc="-1" strike="noStrike">
-                <a:latin typeface="Arial"/>
-              </a:rPr>
-              <a:t>Data scientist, plot development</a:t>
-            </a:r>
-            <a:endParaRPr b="0" lang="en-US" sz="2800" spc="-1" strike="noStrike">
+              <a:t>MariaDB/CentOS backend</a:t>
+            </a:r>
+            <a:endParaRPr b="0" lang="en-US" sz="3200" spc="-1" strike="noStrike">
               <a:latin typeface="Arial"/>
             </a:endParaRPr>
           </a:p>
@@ -2198,14 +4747,314 @@
               <a:rPr b="0" lang="en-US" sz="3200" spc="-1" strike="noStrike">
                 <a:latin typeface="Arial"/>
               </a:rPr>
-              <a:t>Nicholas Grogg</a:t>
-            </a:r>
-            <a:endParaRPr b="0" lang="en-US" sz="3200" spc="-1" strike="noStrike">
-              <a:latin typeface="Arial"/>
-            </a:endParaRPr>
-          </a:p>
-          <a:p>
-            <a:pPr lvl="1" marL="864000" indent="-324000">
+              <a:t>Python plots</a:t>
+            </a:r>
+            <a:endParaRPr b="0" lang="en-US" sz="3200" spc="-1" strike="noStrike">
+              <a:latin typeface="Arial"/>
+            </a:endParaRPr>
+          </a:p>
+        </p:txBody>
+      </p:sp>
+    </p:spTree>
+  </p:cSld>
+  <mc:AlternateContent>
+    <mc:Choice Requires="p14">
+      <p:transition spd="slow" p14:dur="2000"/>
+    </mc:Choice>
+    <mc:Fallback>
+      <p:transition spd="slow"/>
+    </mc:Fallback>
+  </mc:AlternateContent>
+</p:sld>
+</file>
+
+<file path=ppt/slides/slide5.xml><?xml version="1.0" encoding="utf-8"?>
+<p:sld xmlns:a="http://schemas.openxmlformats.org/drawingml/2006/main" xmlns:p="http://schemas.openxmlformats.org/presentationml/2006/main" xmlns:r="http://schemas.openxmlformats.org/officeDocument/2006/relationships" xmlns:p14="http://schemas.microsoft.com/office/powerpoint/2010/main" xmlns:p15="http://schemas.microsoft.com/office/powerpoint/2012/main" xmlns:mc="http://schemas.openxmlformats.org/markup-compatibility/2006">
+  <p:cSld>
+    <p:spTree>
+      <p:nvGrpSpPr>
+        <p:cNvPr id="1" name=""/>
+        <p:cNvGrpSpPr/>
+        <p:nvPr/>
+      </p:nvGrpSpPr>
+      <p:grpSpPr>
+        <a:xfrm>
+          <a:off x="0" y="0"/>
+          <a:ext cx="0" cy="0"/>
+          <a:chOff x="0" y="0"/>
+          <a:chExt cx="0" cy="0"/>
+        </a:xfrm>
+      </p:grpSpPr>
+      <p:sp>
+        <p:nvSpPr>
+          <p:cNvPr id="83" name="TextShape 1"/>
+          <p:cNvSpPr txBox="1"/>
+          <p:nvPr/>
+        </p:nvSpPr>
+        <p:spPr>
+          <a:xfrm>
+            <a:off x="504000" y="226080"/>
+            <a:ext cx="9071280" cy="946080"/>
+          </a:xfrm>
+          <a:prstGeom prst="rect">
+            <a:avLst/>
+          </a:prstGeom>
+          <a:noFill/>
+          <a:ln>
+            <a:noFill/>
+          </a:ln>
+        </p:spPr>
+        <p:txBody>
+          <a:bodyPr lIns="0" rIns="0" tIns="0" bIns="0" anchor="ctr">
+            <a:noAutofit/>
+          </a:bodyPr>
+          <a:p>
+            <a:pPr algn="ctr"/>
+            <a:r>
+              <a:rPr b="0" lang="en-US" sz="4400" spc="-1" strike="noStrike">
+                <a:latin typeface="Arial"/>
+              </a:rPr>
+              <a:t>What did we learn?</a:t>
+            </a:r>
+            <a:endParaRPr b="0" lang="en-US" sz="4400" spc="-1" strike="noStrike">
+              <a:latin typeface="Arial"/>
+            </a:endParaRPr>
+          </a:p>
+        </p:txBody>
+      </p:sp>
+      <p:sp>
+        <p:nvSpPr>
+          <p:cNvPr id="84" name="TextShape 2"/>
+          <p:cNvSpPr txBox="1"/>
+          <p:nvPr/>
+        </p:nvSpPr>
+        <p:spPr>
+          <a:xfrm>
+            <a:off x="504000" y="1326600"/>
+            <a:ext cx="9071280" cy="3287880"/>
+          </a:xfrm>
+          <a:prstGeom prst="rect">
+            <a:avLst/>
+          </a:prstGeom>
+          <a:noFill/>
+          <a:ln>
+            <a:noFill/>
+          </a:ln>
+        </p:spPr>
+        <p:txBody>
+          <a:bodyPr lIns="0" rIns="0" tIns="0" bIns="0">
+            <a:normAutofit/>
+          </a:bodyPr>
+          <a:p>
+            <a:endParaRPr b="0" lang="en-US" sz="3200" spc="-1" strike="noStrike">
+              <a:latin typeface="Arial"/>
+            </a:endParaRPr>
+          </a:p>
+        </p:txBody>
+      </p:sp>
+    </p:spTree>
+  </p:cSld>
+  <mc:AlternateContent>
+    <mc:Choice Requires="p14">
+      <p:transition spd="slow" p14:dur="2000"/>
+    </mc:Choice>
+    <mc:Fallback>
+      <p:transition spd="slow"/>
+    </mc:Fallback>
+  </mc:AlternateContent>
+</p:sld>
+</file>
+
+<file path=ppt/slides/slide6.xml><?xml version="1.0" encoding="utf-8"?>
+<p:sld xmlns:a="http://schemas.openxmlformats.org/drawingml/2006/main" xmlns:p="http://schemas.openxmlformats.org/presentationml/2006/main" xmlns:r="http://schemas.openxmlformats.org/officeDocument/2006/relationships" xmlns:p14="http://schemas.microsoft.com/office/powerpoint/2010/main" xmlns:p15="http://schemas.microsoft.com/office/powerpoint/2012/main" xmlns:mc="http://schemas.openxmlformats.org/markup-compatibility/2006">
+  <p:cSld>
+    <p:spTree>
+      <p:nvGrpSpPr>
+        <p:cNvPr id="1" name=""/>
+        <p:cNvGrpSpPr/>
+        <p:nvPr/>
+      </p:nvGrpSpPr>
+      <p:grpSpPr>
+        <a:xfrm>
+          <a:off x="0" y="0"/>
+          <a:ext cx="0" cy="0"/>
+          <a:chOff x="0" y="0"/>
+          <a:chExt cx="0" cy="0"/>
+        </a:xfrm>
+      </p:grpSpPr>
+      <p:sp>
+        <p:nvSpPr>
+          <p:cNvPr id="85" name="TextShape 1"/>
+          <p:cNvSpPr txBox="1"/>
+          <p:nvPr/>
+        </p:nvSpPr>
+        <p:spPr>
+          <a:xfrm>
+            <a:off x="504000" y="226080"/>
+            <a:ext cx="9071280" cy="4386600"/>
+          </a:xfrm>
+          <a:prstGeom prst="rect">
+            <a:avLst/>
+          </a:prstGeom>
+          <a:noFill/>
+          <a:ln>
+            <a:noFill/>
+          </a:ln>
+        </p:spPr>
+        <p:txBody>
+          <a:bodyPr lIns="0" rIns="0" tIns="0" bIns="0" anchor="ctr">
+            <a:noAutofit/>
+          </a:bodyPr>
+          <a:p>
+            <a:pPr algn="ctr"/>
+            <a:r>
+              <a:rPr b="0" lang="en-US" sz="3200" spc="-1" strike="noStrike">
+                <a:latin typeface="Arial"/>
+              </a:rPr>
+              <a:t>Section 2: Project Overview</a:t>
+            </a:r>
+            <a:endParaRPr b="0" lang="en-US" sz="3200" spc="-1" strike="noStrike">
+              <a:latin typeface="Arial"/>
+            </a:endParaRPr>
+          </a:p>
+        </p:txBody>
+      </p:sp>
+    </p:spTree>
+  </p:cSld>
+  <mc:AlternateContent>
+    <mc:Choice Requires="p14">
+      <p:transition spd="slow" p14:dur="2000"/>
+    </mc:Choice>
+    <mc:Fallback>
+      <p:transition spd="slow"/>
+    </mc:Fallback>
+  </mc:AlternateContent>
+</p:sld>
+</file>
+
+<file path=ppt/slides/slide7.xml><?xml version="1.0" encoding="utf-8"?>
+<p:sld xmlns:a="http://schemas.openxmlformats.org/drawingml/2006/main" xmlns:p="http://schemas.openxmlformats.org/presentationml/2006/main" xmlns:r="http://schemas.openxmlformats.org/officeDocument/2006/relationships" xmlns:p14="http://schemas.microsoft.com/office/powerpoint/2010/main" xmlns:p15="http://schemas.microsoft.com/office/powerpoint/2012/main" xmlns:mc="http://schemas.openxmlformats.org/markup-compatibility/2006">
+  <p:cSld>
+    <p:spTree>
+      <p:nvGrpSpPr>
+        <p:cNvPr id="1" name=""/>
+        <p:cNvGrpSpPr/>
+        <p:nvPr/>
+      </p:nvGrpSpPr>
+      <p:grpSpPr>
+        <a:xfrm>
+          <a:off x="0" y="0"/>
+          <a:ext cx="0" cy="0"/>
+          <a:chOff x="0" y="0"/>
+          <a:chExt cx="0" cy="0"/>
+        </a:xfrm>
+      </p:grpSpPr>
+      <p:sp>
+        <p:nvSpPr>
+          <p:cNvPr id="86" name="CustomShape 1"/>
+          <p:cNvSpPr/>
+          <p:nvPr/>
+        </p:nvSpPr>
+        <p:spPr>
+          <a:xfrm>
+            <a:off x="504000" y="226080"/>
+            <a:ext cx="9071280" cy="946080"/>
+          </a:xfrm>
+          <a:prstGeom prst="rect">
+            <a:avLst/>
+          </a:prstGeom>
+          <a:noFill/>
+          <a:ln>
+            <a:noFill/>
+          </a:ln>
+        </p:spPr>
+        <p:style>
+          <a:lnRef idx="0"/>
+          <a:fillRef idx="0"/>
+          <a:effectRef idx="0"/>
+          <a:fontRef idx="minor"/>
+        </p:style>
+        <p:txBody>
+          <a:bodyPr lIns="0" rIns="0" tIns="0" bIns="0" anchor="ctr">
+            <a:noAutofit/>
+          </a:bodyPr>
+          <a:p>
+            <a:pPr algn="ctr">
+              <a:lnSpc>
+                <a:spcPct val="100000"/>
+              </a:lnSpc>
+            </a:pPr>
+            <a:r>
+              <a:rPr b="0" lang="en-US" sz="4400" spc="-1" strike="noStrike">
+                <a:latin typeface="Arial"/>
+              </a:rPr>
+              <a:t>Project overview</a:t>
+            </a:r>
+            <a:endParaRPr b="0" lang="en-US" sz="4400" spc="-1" strike="noStrike">
+              <a:latin typeface="Arial"/>
+            </a:endParaRPr>
+          </a:p>
+        </p:txBody>
+      </p:sp>
+      <p:sp>
+        <p:nvSpPr>
+          <p:cNvPr id="87" name="CustomShape 2"/>
+          <p:cNvSpPr/>
+          <p:nvPr/>
+        </p:nvSpPr>
+        <p:spPr>
+          <a:xfrm>
+            <a:off x="504000" y="1326600"/>
+            <a:ext cx="9071280" cy="3287880"/>
+          </a:xfrm>
+          <a:prstGeom prst="rect">
+            <a:avLst/>
+          </a:prstGeom>
+          <a:noFill/>
+          <a:ln>
+            <a:noFill/>
+          </a:ln>
+        </p:spPr>
+        <p:style>
+          <a:lnRef idx="0"/>
+          <a:fillRef idx="0"/>
+          <a:effectRef idx="0"/>
+          <a:fontRef idx="minor"/>
+        </p:style>
+        <p:txBody>
+          <a:bodyPr lIns="0" rIns="0" tIns="0" bIns="0">
+            <a:normAutofit/>
+          </a:bodyPr>
+          <a:p>
+            <a:pPr marL="432000" indent="-323640">
+              <a:lnSpc>
+                <a:spcPct val="100000"/>
+              </a:lnSpc>
+              <a:spcBef>
+                <a:spcPts val="1417"/>
+              </a:spcBef>
+              <a:buClr>
+                <a:srgbClr val="000000"/>
+              </a:buClr>
+              <a:buSzPct val="45000"/>
+              <a:buFont typeface="Wingdings" charset="2"/>
+              <a:buChar char=""/>
+            </a:pPr>
+            <a:r>
+              <a:rPr b="0" lang="en-US" sz="3200" spc="-1" strike="noStrike">
+                <a:latin typeface="Arial"/>
+              </a:rPr>
+              <a:t>Mapping application</a:t>
+            </a:r>
+            <a:endParaRPr b="0" lang="en-US" sz="3200" spc="-1" strike="noStrike">
+              <a:latin typeface="Arial"/>
+            </a:endParaRPr>
+          </a:p>
+          <a:p>
+            <a:pPr lvl="1" marL="864000" indent="-323640">
+              <a:lnSpc>
+                <a:spcPct val="100000"/>
+              </a:lnSpc>
               <a:spcBef>
                 <a:spcPts val="1134"/>
               </a:spcBef>
@@ -2213,16 +5062,421 @@
                 <a:srgbClr val="000000"/>
               </a:buClr>
               <a:buSzPct val="75000"/>
-              <a:buFont typeface="Symbol" charset="2"/>
+              <a:buFont typeface="Symbol"/>
               <a:buChar char=""/>
             </a:pPr>
             <a:r>
               <a:rPr b="0" lang="en-US" sz="2800" spc="-1" strike="noStrike">
                 <a:latin typeface="Arial"/>
               </a:rPr>
+              <a:t>Maps COVID 19 data</a:t>
+            </a:r>
+            <a:endParaRPr b="0" lang="en-US" sz="2800" spc="-1" strike="noStrike">
+              <a:latin typeface="Arial"/>
+            </a:endParaRPr>
+          </a:p>
+          <a:p>
+            <a:pPr marL="432000" indent="-323640">
+              <a:lnSpc>
+                <a:spcPct val="100000"/>
+              </a:lnSpc>
+              <a:spcBef>
+                <a:spcPts val="1417"/>
+              </a:spcBef>
+              <a:buClr>
+                <a:srgbClr val="000000"/>
+              </a:buClr>
+              <a:buSzPct val="45000"/>
+              <a:buFont typeface="Wingdings" charset="2"/>
+              <a:buChar char=""/>
+            </a:pPr>
+            <a:r>
+              <a:rPr b="0" lang="en-US" sz="3200" spc="-1" strike="noStrike">
+                <a:latin typeface="Arial"/>
+              </a:rPr>
+              <a:t>GUI with web hosted backend</a:t>
+            </a:r>
+            <a:endParaRPr b="0" lang="en-US" sz="3200" spc="-1" strike="noStrike">
+              <a:latin typeface="Arial"/>
+            </a:endParaRPr>
+          </a:p>
+          <a:p>
+            <a:pPr marL="432000" indent="-323640">
+              <a:lnSpc>
+                <a:spcPct val="100000"/>
+              </a:lnSpc>
+              <a:spcBef>
+                <a:spcPts val="1417"/>
+              </a:spcBef>
+              <a:buClr>
+                <a:srgbClr val="000000"/>
+              </a:buClr>
+              <a:buSzPct val="45000"/>
+              <a:buFont typeface="Wingdings" charset="2"/>
+              <a:buChar char=""/>
+            </a:pPr>
+            <a:r>
+              <a:rPr b="0" lang="en-US" sz="3200" spc="-1" strike="noStrike">
+                <a:latin typeface="Arial"/>
+              </a:rPr>
+              <a:t>Python and MariaDB</a:t>
+            </a:r>
+            <a:endParaRPr b="0" lang="en-US" sz="3200" spc="-1" strike="noStrike">
+              <a:latin typeface="Arial"/>
+            </a:endParaRPr>
+          </a:p>
+        </p:txBody>
+      </p:sp>
+    </p:spTree>
+  </p:cSld>
+  <mc:AlternateContent>
+    <mc:Choice Requires="p14">
+      <p:transition spd="slow" p14:dur="2000"/>
+    </mc:Choice>
+    <mc:Fallback>
+      <p:transition spd="slow"/>
+    </mc:Fallback>
+  </mc:AlternateContent>
+</p:sld>
+</file>
+
+<file path=ppt/slides/slide8.xml><?xml version="1.0" encoding="utf-8"?>
+<p:sld xmlns:a="http://schemas.openxmlformats.org/drawingml/2006/main" xmlns:p="http://schemas.openxmlformats.org/presentationml/2006/main" xmlns:r="http://schemas.openxmlformats.org/officeDocument/2006/relationships" xmlns:p14="http://schemas.microsoft.com/office/powerpoint/2010/main" xmlns:p15="http://schemas.microsoft.com/office/powerpoint/2012/main" xmlns:mc="http://schemas.openxmlformats.org/markup-compatibility/2006">
+  <p:cSld>
+    <p:spTree>
+      <p:nvGrpSpPr>
+        <p:cNvPr id="1" name=""/>
+        <p:cNvGrpSpPr/>
+        <p:nvPr/>
+      </p:nvGrpSpPr>
+      <p:grpSpPr>
+        <a:xfrm>
+          <a:off x="0" y="0"/>
+          <a:ext cx="0" cy="0"/>
+          <a:chOff x="0" y="0"/>
+          <a:chExt cx="0" cy="0"/>
+        </a:xfrm>
+      </p:grpSpPr>
+      <p:sp>
+        <p:nvSpPr>
+          <p:cNvPr id="88" name="CustomShape 1"/>
+          <p:cNvSpPr/>
+          <p:nvPr/>
+        </p:nvSpPr>
+        <p:spPr>
+          <a:xfrm>
+            <a:off x="504000" y="226080"/>
+            <a:ext cx="9071280" cy="946080"/>
+          </a:xfrm>
+          <a:prstGeom prst="rect">
+            <a:avLst/>
+          </a:prstGeom>
+          <a:noFill/>
+          <a:ln>
+            <a:noFill/>
+          </a:ln>
+        </p:spPr>
+        <p:style>
+          <a:lnRef idx="0"/>
+          <a:fillRef idx="0"/>
+          <a:effectRef idx="0"/>
+          <a:fontRef idx="minor"/>
+        </p:style>
+        <p:txBody>
+          <a:bodyPr lIns="0" rIns="0" tIns="0" bIns="0" anchor="ctr">
+            <a:noAutofit/>
+          </a:bodyPr>
+          <a:p>
+            <a:pPr algn="ctr">
+              <a:lnSpc>
+                <a:spcPct val="100000"/>
+              </a:lnSpc>
+            </a:pPr>
+            <a:r>
+              <a:rPr b="0" lang="en-US" sz="4400" spc="-1" strike="noStrike">
+                <a:latin typeface="Arial"/>
+              </a:rPr>
+              <a:t>User roles</a:t>
+            </a:r>
+            <a:endParaRPr b="0" lang="en-US" sz="4400" spc="-1" strike="noStrike">
+              <a:latin typeface="Arial"/>
+            </a:endParaRPr>
+          </a:p>
+        </p:txBody>
+      </p:sp>
+      <p:sp>
+        <p:nvSpPr>
+          <p:cNvPr id="89" name="CustomShape 2"/>
+          <p:cNvSpPr/>
+          <p:nvPr/>
+        </p:nvSpPr>
+        <p:spPr>
+          <a:xfrm>
+            <a:off x="504000" y="1326600"/>
+            <a:ext cx="9071280" cy="3287880"/>
+          </a:xfrm>
+          <a:prstGeom prst="rect">
+            <a:avLst/>
+          </a:prstGeom>
+          <a:noFill/>
+          <a:ln>
+            <a:noFill/>
+          </a:ln>
+        </p:spPr>
+        <p:style>
+          <a:lnRef idx="0"/>
+          <a:fillRef idx="0"/>
+          <a:effectRef idx="0"/>
+          <a:fontRef idx="minor"/>
+        </p:style>
+        <p:txBody>
+          <a:bodyPr lIns="0" rIns="0" tIns="0" bIns="0">
+            <a:normAutofit fontScale="97000"/>
+          </a:bodyPr>
+          <a:p>
+            <a:pPr marL="432000" indent="-323640">
+              <a:lnSpc>
+                <a:spcPct val="100000"/>
+              </a:lnSpc>
+              <a:spcBef>
+                <a:spcPts val="1417"/>
+              </a:spcBef>
+              <a:buClr>
+                <a:srgbClr val="000000"/>
+              </a:buClr>
+              <a:buSzPct val="45000"/>
+              <a:buFont typeface="Wingdings" charset="2"/>
+              <a:buChar char=""/>
+            </a:pPr>
+            <a:r>
+              <a:rPr b="0" lang="en-US" sz="3200" spc="-1" strike="noStrike">
+                <a:latin typeface="Arial"/>
+              </a:rPr>
+              <a:t>Emily Risley</a:t>
+            </a:r>
+            <a:endParaRPr b="0" lang="en-US" sz="3200" spc="-1" strike="noStrike">
+              <a:latin typeface="Arial"/>
+            </a:endParaRPr>
+          </a:p>
+          <a:p>
+            <a:pPr lvl="1" marL="864000" indent="-323640">
+              <a:lnSpc>
+                <a:spcPct val="100000"/>
+              </a:lnSpc>
+              <a:spcBef>
+                <a:spcPts val="1134"/>
+              </a:spcBef>
+              <a:buClr>
+                <a:srgbClr val="000000"/>
+              </a:buClr>
+              <a:buSzPct val="75000"/>
+              <a:buFont typeface="Symbol"/>
+              <a:buChar char=""/>
+            </a:pPr>
+            <a:r>
+              <a:rPr b="0" lang="en-US" sz="2800" spc="-1" strike="noStrike">
+                <a:latin typeface="Arial"/>
+              </a:rPr>
+              <a:t>Team lead, GUI development</a:t>
+            </a:r>
+            <a:endParaRPr b="0" lang="en-US" sz="2800" spc="-1" strike="noStrike">
+              <a:latin typeface="Arial"/>
+            </a:endParaRPr>
+          </a:p>
+          <a:p>
+            <a:pPr marL="432000" indent="-323640">
+              <a:lnSpc>
+                <a:spcPct val="100000"/>
+              </a:lnSpc>
+              <a:spcBef>
+                <a:spcPts val="1417"/>
+              </a:spcBef>
+              <a:buClr>
+                <a:srgbClr val="000000"/>
+              </a:buClr>
+              <a:buSzPct val="45000"/>
+              <a:buFont typeface="Wingdings" charset="2"/>
+              <a:buChar char=""/>
+            </a:pPr>
+            <a:r>
+              <a:rPr b="0" lang="en-US" sz="3200" spc="-1" strike="noStrike">
+                <a:latin typeface="Arial"/>
+              </a:rPr>
+              <a:t>Timothy Kudryn</a:t>
+            </a:r>
+            <a:endParaRPr b="0" lang="en-US" sz="3200" spc="-1" strike="noStrike">
+              <a:latin typeface="Arial"/>
+            </a:endParaRPr>
+          </a:p>
+          <a:p>
+            <a:pPr lvl="1" marL="864000" indent="-323640">
+              <a:lnSpc>
+                <a:spcPct val="100000"/>
+              </a:lnSpc>
+              <a:spcBef>
+                <a:spcPts val="1134"/>
+              </a:spcBef>
+              <a:buClr>
+                <a:srgbClr val="000000"/>
+              </a:buClr>
+              <a:buSzPct val="75000"/>
+              <a:buFont typeface="Symbol"/>
+              <a:buChar char=""/>
+            </a:pPr>
+            <a:r>
+              <a:rPr b="0" lang="en-US" sz="2800" spc="-1" strike="noStrike">
+                <a:latin typeface="Arial"/>
+              </a:rPr>
+              <a:t>Data scientist, plot development</a:t>
+            </a:r>
+            <a:endParaRPr b="0" lang="en-US" sz="2800" spc="-1" strike="noStrike">
+              <a:latin typeface="Arial"/>
+            </a:endParaRPr>
+          </a:p>
+          <a:p>
+            <a:pPr marL="432000" indent="-323640">
+              <a:lnSpc>
+                <a:spcPct val="100000"/>
+              </a:lnSpc>
+              <a:spcBef>
+                <a:spcPts val="1417"/>
+              </a:spcBef>
+              <a:buClr>
+                <a:srgbClr val="000000"/>
+              </a:buClr>
+              <a:buSzPct val="45000"/>
+              <a:buFont typeface="Wingdings" charset="2"/>
+              <a:buChar char=""/>
+            </a:pPr>
+            <a:r>
+              <a:rPr b="0" lang="en-US" sz="3200" spc="-1" strike="noStrike">
+                <a:latin typeface="Arial"/>
+              </a:rPr>
+              <a:t>Nicholas Grogg</a:t>
+            </a:r>
+            <a:endParaRPr b="0" lang="en-US" sz="3200" spc="-1" strike="noStrike">
+              <a:latin typeface="Arial"/>
+            </a:endParaRPr>
+          </a:p>
+          <a:p>
+            <a:pPr lvl="1" marL="864000" indent="-323640">
+              <a:lnSpc>
+                <a:spcPct val="100000"/>
+              </a:lnSpc>
+              <a:spcBef>
+                <a:spcPts val="1134"/>
+              </a:spcBef>
+              <a:buClr>
+                <a:srgbClr val="000000"/>
+              </a:buClr>
+              <a:buSzPct val="75000"/>
+              <a:buFont typeface="Symbol"/>
+              <a:buChar char=""/>
+            </a:pPr>
+            <a:r>
+              <a:rPr b="0" lang="en-US" sz="2800" spc="-1" strike="noStrike">
+                <a:latin typeface="Arial"/>
+              </a:rPr>
               <a:t>Backend dev</a:t>
             </a:r>
             <a:endParaRPr b="0" lang="en-US" sz="2800" spc="-1" strike="noStrike">
+              <a:latin typeface="Arial"/>
+            </a:endParaRPr>
+          </a:p>
+        </p:txBody>
+      </p:sp>
+    </p:spTree>
+  </p:cSld>
+  <mc:AlternateContent>
+    <mc:Choice Requires="p14">
+      <p:transition spd="slow" p14:dur="2000"/>
+    </mc:Choice>
+    <mc:Fallback>
+      <p:transition spd="slow"/>
+    </mc:Fallback>
+  </mc:AlternateContent>
+</p:sld>
+</file>
+
+<file path=ppt/slides/slide9.xml><?xml version="1.0" encoding="utf-8"?>
+<p:sld xmlns:a="http://schemas.openxmlformats.org/drawingml/2006/main" xmlns:p="http://schemas.openxmlformats.org/presentationml/2006/main" xmlns:r="http://schemas.openxmlformats.org/officeDocument/2006/relationships" xmlns:p14="http://schemas.microsoft.com/office/powerpoint/2010/main" xmlns:p15="http://schemas.microsoft.com/office/powerpoint/2012/main" xmlns:mc="http://schemas.openxmlformats.org/markup-compatibility/2006">
+  <p:cSld>
+    <p:spTree>
+      <p:nvGrpSpPr>
+        <p:cNvPr id="1" name=""/>
+        <p:cNvGrpSpPr/>
+        <p:nvPr/>
+      </p:nvGrpSpPr>
+      <p:grpSpPr>
+        <a:xfrm>
+          <a:off x="0" y="0"/>
+          <a:ext cx="0" cy="0"/>
+          <a:chOff x="0" y="0"/>
+          <a:chExt cx="0" cy="0"/>
+        </a:xfrm>
+      </p:grpSpPr>
+      <p:sp>
+        <p:nvSpPr>
+          <p:cNvPr id="90" name="TextShape 1"/>
+          <p:cNvSpPr txBox="1"/>
+          <p:nvPr/>
+        </p:nvSpPr>
+        <p:spPr>
+          <a:xfrm>
+            <a:off x="504000" y="226080"/>
+            <a:ext cx="9071280" cy="946080"/>
+          </a:xfrm>
+          <a:prstGeom prst="rect">
+            <a:avLst/>
+          </a:prstGeom>
+          <a:noFill/>
+          <a:ln>
+            <a:noFill/>
+          </a:ln>
+        </p:spPr>
+        <p:txBody>
+          <a:bodyPr lIns="0" rIns="0" tIns="0" bIns="0" anchor="ctr">
+            <a:noAutofit/>
+          </a:bodyPr>
+          <a:p>
+            <a:pPr algn="ctr"/>
+            <a:r>
+              <a:rPr b="0" lang="en-US" sz="4400" spc="-1" strike="noStrike">
+                <a:latin typeface="Arial"/>
+              </a:rPr>
+              <a:t>GUI</a:t>
+            </a:r>
+            <a:endParaRPr b="0" lang="en-US" sz="4400" spc="-1" strike="noStrike">
+              <a:latin typeface="Arial"/>
+            </a:endParaRPr>
+          </a:p>
+        </p:txBody>
+      </p:sp>
+      <p:sp>
+        <p:nvSpPr>
+          <p:cNvPr id="91" name="TextShape 2"/>
+          <p:cNvSpPr txBox="1"/>
+          <p:nvPr/>
+        </p:nvSpPr>
+        <p:spPr>
+          <a:xfrm>
+            <a:off x="504000" y="1326600"/>
+            <a:ext cx="9071280" cy="3287880"/>
+          </a:xfrm>
+          <a:prstGeom prst="rect">
+            <a:avLst/>
+          </a:prstGeom>
+          <a:noFill/>
+          <a:ln>
+            <a:noFill/>
+          </a:ln>
+        </p:spPr>
+        <p:txBody>
+          <a:bodyPr lIns="0" rIns="0" tIns="0" bIns="0">
+            <a:normAutofit/>
+          </a:bodyPr>
+          <a:p>
+            <a:endParaRPr b="0" lang="en-US" sz="3200" spc="-1" strike="noStrike">
               <a:latin typeface="Arial"/>
             </a:endParaRPr>
           </a:p>
@@ -2465,4 +5719,230 @@
     </a:fmtScheme>
   </a:themeElements>
 </a:theme>
+</file>
+
+<file path=ppt/theme/theme2.xml><?xml version="1.0" encoding="utf-8"?>
+<a:theme xmlns:a="http://schemas.openxmlformats.org/drawingml/2006/main" name="Office Theme">
+  <a:themeElements>
+    <a:clrScheme name="Office">
+      <a:dk1>
+        <a:sysClr val="windowText" lastClr="000000"/>
+      </a:dk1>
+      <a:lt1>
+        <a:sysClr val="window" lastClr="FFFFFF"/>
+      </a:lt1>
+      <a:dk2>
+        <a:srgbClr val="1f497d"/>
+      </a:dk2>
+      <a:lt2>
+        <a:srgbClr val="eeece1"/>
+      </a:lt2>
+      <a:accent1>
+        <a:srgbClr val="4f81bd"/>
+      </a:accent1>
+      <a:accent2>
+        <a:srgbClr val="c0504d"/>
+      </a:accent2>
+      <a:accent3>
+        <a:srgbClr val="9bbb59"/>
+      </a:accent3>
+      <a:accent4>
+        <a:srgbClr val="8064a2"/>
+      </a:accent4>
+      <a:accent5>
+        <a:srgbClr val="4bacc6"/>
+      </a:accent5>
+      <a:accent6>
+        <a:srgbClr val="f79646"/>
+      </a:accent6>
+      <a:hlink>
+        <a:srgbClr val="0000ff"/>
+      </a:hlink>
+      <a:folHlink>
+        <a:srgbClr val="800080"/>
+      </a:folHlink>
+    </a:clrScheme>
+    <a:fontScheme name="Office">
+      <a:majorFont>
+        <a:latin typeface="Arial"/>
+        <a:ea typeface="DejaVu Sans"/>
+        <a:cs typeface="DejaVu Sans"/>
+      </a:majorFont>
+      <a:minorFont>
+        <a:latin typeface="Arial"/>
+        <a:ea typeface="DejaVu Sans"/>
+        <a:cs typeface="DejaVu Sans"/>
+      </a:minorFont>
+    </a:fontScheme>
+    <a:fmtScheme name="Office">
+      <a:fillStyleLst>
+        <a:solidFill>
+          <a:schemeClr val="phClr"/>
+        </a:solidFill>
+        <a:gradFill rotWithShape="1">
+          <a:gsLst>
+            <a:gs pos="0">
+              <a:schemeClr val="phClr">
+                <a:tint val="50000"/>
+                <a:satMod val="300000"/>
+              </a:schemeClr>
+            </a:gs>
+            <a:gs pos="35000">
+              <a:schemeClr val="phClr">
+                <a:tint val="37000"/>
+                <a:satMod val="300000"/>
+              </a:schemeClr>
+            </a:gs>
+            <a:gs pos="100000">
+              <a:schemeClr val="phClr">
+                <a:tint val="15000"/>
+                <a:satMod val="350000"/>
+              </a:schemeClr>
+            </a:gs>
+          </a:gsLst>
+          <a:lin ang="16200000" scaled="1"/>
+        </a:gradFill>
+        <a:gradFill rotWithShape="1">
+          <a:gsLst>
+            <a:gs pos="0">
+              <a:schemeClr val="phClr">
+                <a:shade val="51000"/>
+                <a:satMod val="130000"/>
+              </a:schemeClr>
+            </a:gs>
+            <a:gs pos="80000">
+              <a:schemeClr val="phClr">
+                <a:shade val="93000"/>
+                <a:satMod val="130000"/>
+              </a:schemeClr>
+            </a:gs>
+            <a:gs pos="100000">
+              <a:schemeClr val="phClr">
+                <a:shade val="94000"/>
+                <a:satMod val="135000"/>
+              </a:schemeClr>
+            </a:gs>
+          </a:gsLst>
+          <a:lin ang="16200000" scaled="0"/>
+        </a:gradFill>
+      </a:fillStyleLst>
+      <a:lnStyleLst>
+        <a:ln w="9525" cap="flat" cmpd="sng" algn="ctr">
+          <a:solidFill>
+            <a:schemeClr val="phClr">
+              <a:shade val="95000"/>
+              <a:satMod val="105000"/>
+            </a:schemeClr>
+          </a:solidFill>
+          <a:prstDash val="solid"/>
+          <a:miter/>
+        </a:ln>
+        <a:ln w="25400" cap="flat" cmpd="sng" algn="ctr">
+          <a:solidFill>
+            <a:schemeClr val="phClr"/>
+          </a:solidFill>
+          <a:prstDash val="solid"/>
+          <a:miter/>
+        </a:ln>
+        <a:ln w="38100" cap="flat" cmpd="sng" algn="ctr">
+          <a:solidFill>
+            <a:schemeClr val="phClr"/>
+          </a:solidFill>
+          <a:prstDash val="solid"/>
+          <a:miter/>
+        </a:ln>
+      </a:lnStyleLst>
+      <a:effectStyleLst>
+        <a:effectStyle>
+          <a:effectLst>
+            <a:outerShdw blurRad="40000" dist="20000" dir="5400000" rotWithShape="0">
+              <a:srgbClr val="000000">
+                <a:alpha val="38000"/>
+              </a:srgbClr>
+            </a:outerShdw>
+          </a:effectLst>
+        </a:effectStyle>
+        <a:effectStyle>
+          <a:effectLst>
+            <a:outerShdw blurRad="40000" dist="23000" dir="5400000" rotWithShape="0">
+              <a:srgbClr val="000000">
+                <a:alpha val="35000"/>
+              </a:srgbClr>
+            </a:outerShdw>
+          </a:effectLst>
+        </a:effectStyle>
+        <a:effectStyle>
+          <a:effectLst>
+            <a:outerShdw blurRad="40000" dist="23000" dir="5400000" rotWithShape="0">
+              <a:srgbClr val="000000">
+                <a:alpha val="35000"/>
+              </a:srgbClr>
+            </a:outerShdw>
+          </a:effectLst>
+          <a:scene3d>
+            <a:camera prst="orthographicFront">
+              <a:rot lat="0" lon="0" rev="0"/>
+            </a:camera>
+            <a:lightRig rig="threePt" dir="t">
+              <a:rot lat="0" lon="0" rev="1200000"/>
+            </a:lightRig>
+          </a:scene3d>
+          <a:sp3d>
+            <a:bevelT w="63500" h="25400"/>
+          </a:sp3d>
+        </a:effectStyle>
+      </a:effectStyleLst>
+      <a:bgFillStyleLst>
+        <a:solidFill>
+          <a:schemeClr val="phClr"/>
+        </a:solidFill>
+        <a:gradFill rotWithShape="1">
+          <a:gsLst>
+            <a:gs pos="0">
+              <a:schemeClr val="phClr">
+                <a:tint val="40000"/>
+                <a:satMod val="350000"/>
+              </a:schemeClr>
+            </a:gs>
+            <a:gs pos="40000">
+              <a:schemeClr val="phClr">
+                <a:tint val="45000"/>
+                <a:shade val="99000"/>
+                <a:satMod val="350000"/>
+              </a:schemeClr>
+            </a:gs>
+            <a:gs pos="100000">
+              <a:schemeClr val="phClr">
+                <a:shade val="20000"/>
+                <a:satMod val="255000"/>
+              </a:schemeClr>
+            </a:gs>
+          </a:gsLst>
+          <a:path path="circle">
+            <a:fillToRect l="50000" t="-80000" r="50000" b="180000"/>
+          </a:path>
+        </a:gradFill>
+        <a:gradFill rotWithShape="1">
+          <a:gsLst>
+            <a:gs pos="0">
+              <a:schemeClr val="phClr">
+                <a:tint val="80000"/>
+                <a:satMod val="300000"/>
+              </a:schemeClr>
+            </a:gs>
+            <a:gs pos="100000">
+              <a:schemeClr val="phClr">
+                <a:shade val="30000"/>
+                <a:satMod val="200000"/>
+              </a:schemeClr>
+            </a:gs>
+          </a:gsLst>
+          <a:path path="circle">
+            <a:fillToRect l="50000" t="50000" r="50000" b="50000"/>
+          </a:path>
+        </a:gradFill>
+      </a:bgFillStyleLst>
+    </a:fmtScheme>
+  </a:themeElements>
+</a:theme>
 </file>
</xml_diff>

<commit_message>
updated so if rate is selected, plot file name does contain spaces, and can then be created
</commit_message>
<xml_diff>
--- a/final/presentation.pptx
+++ b/final/presentation.pptx
@@ -123,6 +123,11 @@
       </a:defRPr>
     </a:lvl9pPr>
   </p:defaultTextStyle>
+  <p:extLst>
+    <p:ext uri="{EFAFB233-063F-42B5-8137-9DF3F51BA10A}">
+      <p15:sldGuideLst xmlns:p15="http://schemas.microsoft.com/office/powerpoint/2012/main"/>
+    </p:ext>
+  </p:extLst>
 </p:presentation>
 </file>
 
@@ -3421,8 +3426,16 @@
         <a:lstStyle/>
         <a:p>
           <a:r>
+            <a:rPr lang="en-US" dirty="0"/>
+            <a:t>Enter State (can be All), Date, </a:t>
+          </a:r>
+          <a:r>
             <a:rPr lang="en-US"/>
-            <a:t>Enter State (can be All), Date, and date type</a:t>
+            <a:t>and data </a:t>
+          </a:r>
+          <a:r>
+            <a:rPr lang="en-US" dirty="0"/>
+            <a:t>type</a:t>
           </a:r>
         </a:p>
       </dgm:t>
@@ -4875,8 +4888,16 @@
             <a:buNone/>
           </a:pPr>
           <a:r>
+            <a:rPr lang="en-US" sz="2500" kern="1200" dirty="0"/>
+            <a:t>Enter State (can be All), Date, </a:t>
+          </a:r>
+          <a:r>
             <a:rPr lang="en-US" sz="2500" kern="1200"/>
-            <a:t>Enter State (can be All), Date, and date type</a:t>
+            <a:t>and data </a:t>
+          </a:r>
+          <a:r>
+            <a:rPr lang="en-US" sz="2500" kern="1200" dirty="0"/>
+            <a:t>type</a:t>
           </a:r>
         </a:p>
       </dsp:txBody>
@@ -17221,7 +17242,7 @@
           <p:nvPr>
             <p:extLst>
               <p:ext uri="{D42A27DB-BD31-4B8C-83A1-F6EECF244321}">
-                <p14:modId xmlns:p14="http://schemas.microsoft.com/office/powerpoint/2010/main" val="4253093155"/>
+                <p14:modId xmlns:p14="http://schemas.microsoft.com/office/powerpoint/2010/main" val="2911102115"/>
               </p:ext>
             </p:extLst>
           </p:nvPr>
@@ -18565,7 +18586,7 @@
         </p:spPr>
         <p:txBody>
           <a:bodyPr>
-            <a:normAutofit fontScale="92500"/>
+            <a:normAutofit/>
           </a:bodyPr>
           <a:lstStyle/>
           <a:p>

</xml_diff>